<commit_message>
added distributed system slide notes
</commit_message>
<xml_diff>
--- a/rosp.pptx
+++ b/rosp.pptx
@@ -109,6 +109,11 @@
       </a:defRPr>
     </a:lvl9pPr>
   </p:defaultTextStyle>
+  <p:extLst>
+    <p:ext uri="{EFAFB233-063F-42B5-8137-9DF3F51BA10A}">
+      <p15:sldGuideLst xmlns:p15="http://schemas.microsoft.com/office/powerpoint/2012/main"/>
+    </p:ext>
+  </p:extLst>
 </p:presentation>
 </file>
 
@@ -338,7 +343,7 @@
           <a:p>
             <a:fld id="{11F3512E-3976-4CDE-A8FF-28810ED21FDC}" type="datetimeFigureOut">
               <a:rPr lang="en-US" smtClean="0"/>
-              <a:t>2/5/2019</a:t>
+              <a:t>3/4/2019</a:t>
             </a:fld>
             <a:endParaRPr lang="en-US"/>
           </a:p>
@@ -546,7 +551,7 @@
           <a:p>
             <a:fld id="{11F3512E-3976-4CDE-A8FF-28810ED21FDC}" type="datetimeFigureOut">
               <a:rPr lang="en-US" smtClean="0"/>
-              <a:t>2/5/2019</a:t>
+              <a:t>3/4/2019</a:t>
             </a:fld>
             <a:endParaRPr lang="en-US"/>
           </a:p>
@@ -802,7 +807,7 @@
           <a:p>
             <a:fld id="{11F3512E-3976-4CDE-A8FF-28810ED21FDC}" type="datetimeFigureOut">
               <a:rPr lang="en-US" smtClean="0"/>
-              <a:t>2/5/2019</a:t>
+              <a:t>3/4/2019</a:t>
             </a:fld>
             <a:endParaRPr lang="en-US"/>
           </a:p>
@@ -976,7 +981,7 @@
           <a:p>
             <a:fld id="{11F3512E-3976-4CDE-A8FF-28810ED21FDC}" type="datetimeFigureOut">
               <a:rPr lang="en-US" smtClean="0"/>
-              <a:t>2/5/2019</a:t>
+              <a:t>3/4/2019</a:t>
             </a:fld>
             <a:endParaRPr lang="en-US"/>
           </a:p>
@@ -1319,7 +1324,7 @@
           <a:p>
             <a:fld id="{11F3512E-3976-4CDE-A8FF-28810ED21FDC}" type="datetimeFigureOut">
               <a:rPr lang="en-US" smtClean="0"/>
-              <a:t>2/5/2019</a:t>
+              <a:t>3/4/2019</a:t>
             </a:fld>
             <a:endParaRPr lang="en-US"/>
           </a:p>
@@ -1594,7 +1599,7 @@
           <a:p>
             <a:fld id="{11F3512E-3976-4CDE-A8FF-28810ED21FDC}" type="datetimeFigureOut">
               <a:rPr lang="en-US" smtClean="0"/>
-              <a:t>2/5/2019</a:t>
+              <a:t>3/4/2019</a:t>
             </a:fld>
             <a:endParaRPr lang="en-US"/>
           </a:p>
@@ -1973,7 +1978,7 @@
           <a:p>
             <a:fld id="{11F3512E-3976-4CDE-A8FF-28810ED21FDC}" type="datetimeFigureOut">
               <a:rPr lang="en-US" smtClean="0"/>
-              <a:t>2/5/2019</a:t>
+              <a:t>3/4/2019</a:t>
             </a:fld>
             <a:endParaRPr lang="en-US"/>
           </a:p>
@@ -2091,7 +2096,7 @@
           <a:p>
             <a:fld id="{11F3512E-3976-4CDE-A8FF-28810ED21FDC}" type="datetimeFigureOut">
               <a:rPr lang="en-US" smtClean="0"/>
-              <a:t>2/5/2019</a:t>
+              <a:t>3/4/2019</a:t>
             </a:fld>
             <a:endParaRPr lang="en-US"/>
           </a:p>
@@ -2262,7 +2267,7 @@
           <a:p>
             <a:fld id="{11F3512E-3976-4CDE-A8FF-28810ED21FDC}" type="datetimeFigureOut">
               <a:rPr lang="en-US" smtClean="0"/>
-              <a:t>2/5/2019</a:t>
+              <a:t>3/4/2019</a:t>
             </a:fld>
             <a:endParaRPr lang="en-US"/>
           </a:p>
@@ -2616,7 +2621,7 @@
           <a:p>
             <a:fld id="{11F3512E-3976-4CDE-A8FF-28810ED21FDC}" type="datetimeFigureOut">
               <a:rPr lang="en-US" smtClean="0"/>
-              <a:t>2/5/2019</a:t>
+              <a:t>3/4/2019</a:t>
             </a:fld>
             <a:endParaRPr lang="en-US"/>
           </a:p>
@@ -2998,7 +3003,7 @@
           <a:p>
             <a:fld id="{11F3512E-3976-4CDE-A8FF-28810ED21FDC}" type="datetimeFigureOut">
               <a:rPr lang="en-US" smtClean="0"/>
-              <a:t>2/5/2019</a:t>
+              <a:t>3/4/2019</a:t>
             </a:fld>
             <a:endParaRPr lang="en-US"/>
           </a:p>
@@ -3285,7 +3290,7 @@
           <a:p>
             <a:fld id="{11F3512E-3976-4CDE-A8FF-28810ED21FDC}" type="datetimeFigureOut">
               <a:rPr lang="en-US" smtClean="0"/>
-              <a:t>2/5/2019</a:t>
+              <a:t>3/4/2019</a:t>
             </a:fld>
             <a:endParaRPr lang="en-US"/>
           </a:p>
@@ -3941,7 +3946,9 @@
         </p:nvSpPr>
         <p:spPr/>
         <p:txBody>
-          <a:bodyPr/>
+          <a:bodyPr vert="horz" lIns="0" tIns="45720" rIns="0" bIns="45720" rtlCol="0" anchor="t">
+            <a:normAutofit/>
+          </a:bodyPr>
           <a:lstStyle/>
           <a:p>
             <a:r>
@@ -4042,10 +4049,228 @@
         </p:nvSpPr>
         <p:spPr/>
         <p:txBody>
-          <a:bodyPr/>
-          <a:lstStyle/>
-          <a:p>
-            <a:endParaRPr lang="en-US"/>
+          <a:bodyPr vert="horz" lIns="0" tIns="45720" rIns="0" bIns="45720" rtlCol="0" anchor="t">
+            <a:normAutofit lnSpcReduction="10000"/>
+          </a:bodyPr>
+          <a:lstStyle/>
+          <a:p>
+            <a:pPr>
+              <a:buFont typeface="Arial" panose="020F0502020204030204" pitchFamily="34" charset="0"/>
+              <a:buChar char="•"/>
+            </a:pPr>
+            <a:r>
+              <a:rPr lang="en-US" dirty="0">
+                <a:cs typeface="Calibri"/>
+              </a:rPr>
+              <a:t>A series of network coordinated servers/nodes that can share request load</a:t>
+            </a:r>
+          </a:p>
+          <a:p>
+            <a:pPr marL="383540" lvl="1">
+              <a:buFont typeface="Arial" panose="020F0502020204030204" pitchFamily="34" charset="0"/>
+              <a:buChar char="•"/>
+            </a:pPr>
+            <a:r>
+              <a:rPr lang="en-US" dirty="0">
+                <a:cs typeface="Calibri"/>
+              </a:rPr>
+              <a:t>Can scale on demand ("Horizontal Scaling / Scale Out")</a:t>
+            </a:r>
+            <a:endParaRPr lang="en-US" dirty="0"/>
+          </a:p>
+          <a:p>
+            <a:pPr>
+              <a:buFont typeface="Arial,Sans-Serif" panose="020F0502020204030204" pitchFamily="34" charset="0"/>
+              <a:buChar char="•"/>
+            </a:pPr>
+            <a:r>
+              <a:rPr lang="en-US" dirty="0">
+                <a:cs typeface="Calibri"/>
+              </a:rPr>
+              <a:t>Reads separated from writes</a:t>
+            </a:r>
+          </a:p>
+          <a:p>
+            <a:pPr marL="383540" lvl="1">
+              <a:buFont typeface="Arial,Sans-Serif" panose="020F0502020204030204" pitchFamily="34" charset="0"/>
+              <a:buChar char="•"/>
+            </a:pPr>
+            <a:r>
+              <a:rPr lang="en-US" dirty="0">
+                <a:cs typeface="Calibri"/>
+              </a:rPr>
+              <a:t>Data is consistent within version of database</a:t>
+            </a:r>
+          </a:p>
+          <a:p>
+            <a:pPr marL="383540" lvl="1">
+              <a:buFont typeface="Arial,Sans-Serif" panose="020F0502020204030204" pitchFamily="34" charset="0"/>
+              <a:buChar char="•"/>
+            </a:pPr>
+            <a:r>
+              <a:rPr lang="en-US" dirty="0">
+                <a:cs typeface="Calibri"/>
+              </a:rPr>
+              <a:t>Timestamped transactions</a:t>
+            </a:r>
+          </a:p>
+          <a:p>
+            <a:pPr>
+              <a:buFont typeface="Arial,Sans-Serif" panose="020F0502020204030204" pitchFamily="34" charset="0"/>
+              <a:buChar char="•"/>
+            </a:pPr>
+            <a:r>
+              <a:rPr lang="en-US" dirty="0">
+                <a:cs typeface="Calibri"/>
+              </a:rPr>
+              <a:t>Single </a:t>
+            </a:r>
+            <a:r>
+              <a:rPr lang="en-US" dirty="0" err="1">
+                <a:cs typeface="Calibri"/>
+              </a:rPr>
+              <a:t>Transactor</a:t>
+            </a:r>
+            <a:r>
+              <a:rPr lang="en-US" dirty="0">
+                <a:cs typeface="Calibri"/>
+              </a:rPr>
+              <a:t> for writes</a:t>
+            </a:r>
+          </a:p>
+          <a:p>
+            <a:pPr>
+              <a:buFont typeface="Arial,Sans-Serif" panose="020F0502020204030204" pitchFamily="34" charset="0"/>
+              <a:buChar char="•"/>
+            </a:pPr>
+            <a:r>
+              <a:rPr lang="en-US" dirty="0">
+                <a:cs typeface="Calibri"/>
+              </a:rPr>
+              <a:t>Peers made aware of newer versions of </a:t>
+            </a:r>
+            <a:r>
+              <a:rPr lang="en-US" dirty="0" err="1">
+                <a:cs typeface="Calibri"/>
+              </a:rPr>
+              <a:t>db</a:t>
+            </a:r>
+            <a:r>
+              <a:rPr lang="en-US" dirty="0">
+                <a:cs typeface="Calibri"/>
+              </a:rPr>
+              <a:t> as writes occur</a:t>
+            </a:r>
+          </a:p>
+          <a:p>
+            <a:pPr marL="383540" lvl="1">
+              <a:buFont typeface="Arial,Sans-Serif" panose="020F0502020204030204" pitchFamily="34" charset="0"/>
+              <a:buChar char="•"/>
+            </a:pPr>
+            <a:r>
+              <a:rPr lang="en-US" dirty="0">
+                <a:cs typeface="Calibri"/>
+              </a:rPr>
+              <a:t>Free to query latest or a specific version</a:t>
+            </a:r>
+            <a:endParaRPr lang="en-US" dirty="0"/>
+          </a:p>
+          <a:p>
+            <a:pPr>
+              <a:buFont typeface="Arial" panose="020F0502020204030204" pitchFamily="34" charset="0"/>
+              <a:buChar char="•"/>
+            </a:pPr>
+            <a:r>
+              <a:rPr lang="en-US" dirty="0">
+                <a:cs typeface="Calibri"/>
+              </a:rPr>
+              <a:t>Caches "warmed" to calls from region</a:t>
+            </a:r>
+            <a:endParaRPr lang="en-US" dirty="0"/>
+          </a:p>
+          <a:p>
+            <a:pPr marL="383540" lvl="1">
+              <a:buFont typeface="Arial" panose="020F0502020204030204" pitchFamily="34" charset="0"/>
+              <a:buChar char="•"/>
+            </a:pPr>
+            <a:r>
+              <a:rPr lang="en-US" dirty="0">
+                <a:cs typeface="Calibri"/>
+              </a:rPr>
+              <a:t>No need to hit storage if you have local copy of </a:t>
+            </a:r>
+            <a:r>
+              <a:rPr lang="en-US" dirty="0" err="1">
+                <a:cs typeface="Calibri"/>
+              </a:rPr>
+              <a:t>db</a:t>
+            </a:r>
+          </a:p>
+          <a:p>
+            <a:pPr marL="383540" lvl="1">
+              <a:buFont typeface="Arial" panose="020F0502020204030204" pitchFamily="34" charset="0"/>
+              <a:buChar char="•"/>
+            </a:pPr>
+            <a:r>
+              <a:rPr lang="en-US" dirty="0">
+                <a:cs typeface="Calibri"/>
+              </a:rPr>
+              <a:t>Peers can be specialized for certain roles (Catalog / Analytics) </a:t>
+            </a:r>
+          </a:p>
+          <a:p>
+            <a:pPr>
+              <a:buFont typeface="Arial" panose="020F0502020204030204" pitchFamily="34" charset="0"/>
+              <a:buChar char="•"/>
+            </a:pPr>
+            <a:endParaRPr lang="en-US" dirty="0">
+              <a:cs typeface="Calibri"/>
+            </a:endParaRPr>
+          </a:p>
+          <a:p>
+            <a:pPr>
+              <a:buFont typeface="Arial" panose="020F0502020204030204" pitchFamily="34" charset="0"/>
+              <a:buChar char="•"/>
+            </a:pPr>
+            <a:endParaRPr lang="en-US" dirty="0">
+              <a:cs typeface="Calibri"/>
+            </a:endParaRPr>
+          </a:p>
+          <a:p>
+            <a:pPr>
+              <a:buFont typeface="Arial" panose="020F0502020204030204" pitchFamily="34" charset="0"/>
+              <a:buChar char="•"/>
+            </a:pPr>
+            <a:endParaRPr lang="en-US" dirty="0">
+              <a:cs typeface="Calibri"/>
+            </a:endParaRPr>
+          </a:p>
+          <a:p>
+            <a:pPr marL="383540" lvl="1">
+              <a:buFont typeface="Arial" panose="020F0502020204030204" pitchFamily="34" charset="0"/>
+              <a:buChar char="•"/>
+            </a:pPr>
+            <a:endParaRPr lang="en-US" dirty="0">
+              <a:cs typeface="Calibri"/>
+            </a:endParaRPr>
+          </a:p>
+          <a:p>
+            <a:pPr marL="383540" lvl="1">
+              <a:buFont typeface="Arial" panose="020F0502020204030204" pitchFamily="34" charset="0"/>
+              <a:buChar char="•"/>
+            </a:pPr>
+            <a:endParaRPr lang="en-US" dirty="0">
+              <a:cs typeface="Calibri"/>
+            </a:endParaRPr>
+          </a:p>
+          <a:p>
+            <a:pPr>
+              <a:buFont typeface="Arial" panose="020F0502020204030204" pitchFamily="34" charset="0"/>
+              <a:buChar char="•"/>
+            </a:pPr>
+            <a:endParaRPr lang="en-US" dirty="0">
+              <a:cs typeface="Calibri"/>
+            </a:endParaRPr>
           </a:p>
         </p:txBody>
       </p:sp>

</xml_diff>

<commit_message>
Added slide time and state and current arch
</commit_message>
<xml_diff>
--- a/rosp.pptx
+++ b/rosp.pptx
@@ -9,8 +9,9 @@
     <p:sldId id="257" r:id="rId3"/>
     <p:sldId id="259" r:id="rId4"/>
     <p:sldId id="258" r:id="rId5"/>
-    <p:sldId id="260" r:id="rId6"/>
-    <p:sldId id="261" r:id="rId7"/>
+    <p:sldId id="262" r:id="rId6"/>
+    <p:sldId id="260" r:id="rId7"/>
+    <p:sldId id="261" r:id="rId8"/>
   </p:sldIdLst>
   <p:sldSz cx="12192000" cy="6858000"/>
   <p:notesSz cx="6858000" cy="9144000"/>
@@ -343,7 +344,7 @@
           <a:p>
             <a:fld id="{11F3512E-3976-4CDE-A8FF-28810ED21FDC}" type="datetimeFigureOut">
               <a:rPr lang="en-US" smtClean="0"/>
-              <a:t>3/4/2019</a:t>
+              <a:t>3/5/2019</a:t>
             </a:fld>
             <a:endParaRPr lang="en-US"/>
           </a:p>
@@ -551,7 +552,7 @@
           <a:p>
             <a:fld id="{11F3512E-3976-4CDE-A8FF-28810ED21FDC}" type="datetimeFigureOut">
               <a:rPr lang="en-US" smtClean="0"/>
-              <a:t>3/4/2019</a:t>
+              <a:t>3/5/2019</a:t>
             </a:fld>
             <a:endParaRPr lang="en-US"/>
           </a:p>
@@ -807,7 +808,7 @@
           <a:p>
             <a:fld id="{11F3512E-3976-4CDE-A8FF-28810ED21FDC}" type="datetimeFigureOut">
               <a:rPr lang="en-US" smtClean="0"/>
-              <a:t>3/4/2019</a:t>
+              <a:t>3/5/2019</a:t>
             </a:fld>
             <a:endParaRPr lang="en-US"/>
           </a:p>
@@ -981,7 +982,7 @@
           <a:p>
             <a:fld id="{11F3512E-3976-4CDE-A8FF-28810ED21FDC}" type="datetimeFigureOut">
               <a:rPr lang="en-US" smtClean="0"/>
-              <a:t>3/4/2019</a:t>
+              <a:t>3/5/2019</a:t>
             </a:fld>
             <a:endParaRPr lang="en-US"/>
           </a:p>
@@ -1324,7 +1325,7 @@
           <a:p>
             <a:fld id="{11F3512E-3976-4CDE-A8FF-28810ED21FDC}" type="datetimeFigureOut">
               <a:rPr lang="en-US" smtClean="0"/>
-              <a:t>3/4/2019</a:t>
+              <a:t>3/5/2019</a:t>
             </a:fld>
             <a:endParaRPr lang="en-US"/>
           </a:p>
@@ -1599,7 +1600,7 @@
           <a:p>
             <a:fld id="{11F3512E-3976-4CDE-A8FF-28810ED21FDC}" type="datetimeFigureOut">
               <a:rPr lang="en-US" smtClean="0"/>
-              <a:t>3/4/2019</a:t>
+              <a:t>3/5/2019</a:t>
             </a:fld>
             <a:endParaRPr lang="en-US"/>
           </a:p>
@@ -1978,7 +1979,7 @@
           <a:p>
             <a:fld id="{11F3512E-3976-4CDE-A8FF-28810ED21FDC}" type="datetimeFigureOut">
               <a:rPr lang="en-US" smtClean="0"/>
-              <a:t>3/4/2019</a:t>
+              <a:t>3/5/2019</a:t>
             </a:fld>
             <a:endParaRPr lang="en-US"/>
           </a:p>
@@ -2096,7 +2097,7 @@
           <a:p>
             <a:fld id="{11F3512E-3976-4CDE-A8FF-28810ED21FDC}" type="datetimeFigureOut">
               <a:rPr lang="en-US" smtClean="0"/>
-              <a:t>3/4/2019</a:t>
+              <a:t>3/5/2019</a:t>
             </a:fld>
             <a:endParaRPr lang="en-US"/>
           </a:p>
@@ -2267,7 +2268,7 @@
           <a:p>
             <a:fld id="{11F3512E-3976-4CDE-A8FF-28810ED21FDC}" type="datetimeFigureOut">
               <a:rPr lang="en-US" smtClean="0"/>
-              <a:t>3/4/2019</a:t>
+              <a:t>3/5/2019</a:t>
             </a:fld>
             <a:endParaRPr lang="en-US"/>
           </a:p>
@@ -2621,7 +2622,7 @@
           <a:p>
             <a:fld id="{11F3512E-3976-4CDE-A8FF-28810ED21FDC}" type="datetimeFigureOut">
               <a:rPr lang="en-US" smtClean="0"/>
-              <a:t>3/4/2019</a:t>
+              <a:t>3/5/2019</a:t>
             </a:fld>
             <a:endParaRPr lang="en-US"/>
           </a:p>
@@ -3003,7 +3004,7 @@
           <a:p>
             <a:fld id="{11F3512E-3976-4CDE-A8FF-28810ED21FDC}" type="datetimeFigureOut">
               <a:rPr lang="en-US" smtClean="0"/>
-              <a:t>3/4/2019</a:t>
+              <a:t>3/5/2019</a:t>
             </a:fld>
             <a:endParaRPr lang="en-US"/>
           </a:p>
@@ -3290,7 +3291,7 @@
           <a:p>
             <a:fld id="{11F3512E-3976-4CDE-A8FF-28810ED21FDC}" type="datetimeFigureOut">
               <a:rPr lang="en-US" smtClean="0"/>
-              <a:t>3/4/2019</a:t>
+              <a:t>3/5/2019</a:t>
             </a:fld>
             <a:endParaRPr lang="en-US"/>
           </a:p>
@@ -3923,7 +3924,7 @@
           <a:p>
             <a:r>
               <a:rPr lang="en-US" dirty="0"/>
-              <a:t>Definitions</a:t>
+              <a:t>Definitions – Identifying the problems</a:t>
             </a:r>
           </a:p>
         </p:txBody>
@@ -4290,6 +4291,14 @@
 <file path=ppt/slides/slide4.xml><?xml version="1.0" encoding="utf-8"?>
 <p:sld xmlns:a="http://schemas.openxmlformats.org/drawingml/2006/main" xmlns:r="http://schemas.openxmlformats.org/officeDocument/2006/relationships" xmlns:p="http://schemas.openxmlformats.org/presentationml/2006/main">
   <p:cSld>
+    <p:bg>
+      <p:bgPr>
+        <a:solidFill>
+          <a:schemeClr val="bg1"/>
+        </a:solidFill>
+        <a:effectLst/>
+      </p:bgPr>
+    </p:bg>
     <p:spTree>
       <p:nvGrpSpPr>
         <p:cNvPr id="1" name=""/>
@@ -4304,6 +4313,66 @@
           <a:chExt cx="0" cy="0"/>
         </a:xfrm>
       </p:grpSpPr>
+      <p:sp useBgFill="1">
+        <p:nvSpPr>
+          <p:cNvPr id="21" name="Rectangle 20">
+            <a:extLst>
+              <a:ext uri="{FF2B5EF4-FFF2-40B4-BE49-F238E27FC236}">
+                <a16:creationId xmlns:a16="http://schemas.microsoft.com/office/drawing/2014/main" id="{284B70D5-875B-433D-BDBD-1522A85D6C1D}"/>
+              </a:ext>
+              <a:ext uri="{C183D7F6-B498-43B3-948B-1728B52AA6E4}">
+                <adec:decorative xmlns:adec="http://schemas.microsoft.com/office/drawing/2017/decorative" val="1"/>
+              </a:ext>
+            </a:extLst>
+          </p:cNvPr>
+          <p:cNvSpPr>
+            <a:spLocks noGrp="1" noRot="1" noChangeAspect="1" noMove="1" noResize="1" noEditPoints="1" noAdjustHandles="1" noChangeArrowheads="1" noChangeShapeType="1" noTextEdit="1"/>
+          </p:cNvSpPr>
+          <p:nvPr>
+            <p:extLst>
+              <p:ext uri="{386F3935-93C4-4BCD-93E2-E3B085C9AB24}">
+                <p16:designElem xmlns:p16="http://schemas.microsoft.com/office/powerpoint/2015/main" val="1"/>
+              </p:ext>
+            </p:extLst>
+          </p:nvPr>
+        </p:nvSpPr>
+        <p:spPr>
+          <a:xfrm>
+            <a:off x="0" y="0"/>
+            <a:ext cx="12192001" cy="6334316"/>
+          </a:xfrm>
+          <a:prstGeom prst="rect">
+            <a:avLst/>
+          </a:prstGeom>
+          <a:ln>
+            <a:noFill/>
+          </a:ln>
+        </p:spPr>
+        <p:style>
+          <a:lnRef idx="2">
+            <a:schemeClr val="accent1">
+              <a:shade val="50000"/>
+            </a:schemeClr>
+          </a:lnRef>
+          <a:fillRef idx="1">
+            <a:schemeClr val="accent1"/>
+          </a:fillRef>
+          <a:effectRef idx="0">
+            <a:schemeClr val="accent1"/>
+          </a:effectRef>
+          <a:fontRef idx="minor">
+            <a:schemeClr val="lt1"/>
+          </a:fontRef>
+        </p:style>
+        <p:txBody>
+          <a:bodyPr rtlCol="0" anchor="ctr"/>
+          <a:lstStyle/>
+          <a:p>
+            <a:pPr algn="ctr"/>
+            <a:endParaRPr lang="en-US"/>
+          </a:p>
+        </p:txBody>
+      </p:sp>
       <p:sp>
         <p:nvSpPr>
           <p:cNvPr id="2" name="Title 1">
@@ -4320,9 +4389,16 @@
             <p:ph type="title"/>
           </p:nvPr>
         </p:nvSpPr>
-        <p:spPr/>
-        <p:txBody>
-          <a:bodyPr/>
+        <p:spPr>
+          <a:xfrm>
+            <a:off x="7859485" y="634946"/>
+            <a:ext cx="3690257" cy="1450757"/>
+          </a:xfrm>
+        </p:spPr>
+        <p:txBody>
+          <a:bodyPr>
+            <a:normAutofit/>
+          </a:bodyPr>
           <a:lstStyle/>
           <a:p>
             <a:r>
@@ -4332,6 +4408,101 @@
           </a:p>
         </p:txBody>
       </p:sp>
+      <p:pic>
+        <p:nvPicPr>
+          <p:cNvPr id="7" name="Graphic 6">
+            <a:extLst>
+              <a:ext uri="{FF2B5EF4-FFF2-40B4-BE49-F238E27FC236}">
+                <a16:creationId xmlns:a16="http://schemas.microsoft.com/office/drawing/2014/main" id="{6F4E5FF2-856B-487A-86B4-A9C0B2C484C7}"/>
+              </a:ext>
+            </a:extLst>
+          </p:cNvPr>
+          <p:cNvPicPr>
+            <a:picLocks noChangeAspect="1"/>
+          </p:cNvPicPr>
+          <p:nvPr/>
+        </p:nvPicPr>
+        <p:blipFill>
+          <a:blip r:embed="rId2">
+            <a:extLst>
+              <a:ext uri="{28A0092B-C50C-407E-A947-70E740481C1C}">
+                <a14:useLocalDpi xmlns:a14="http://schemas.microsoft.com/office/drawing/2010/main" val="0"/>
+              </a:ext>
+              <a:ext uri="{837473B0-CC2E-450A-ABE3-18F120FF3D39}">
+                <a1611:picAttrSrcUrl xmlns:a1611="http://schemas.microsoft.com/office/drawing/2016/11/main" r:id="rId3"/>
+              </a:ext>
+            </a:extLst>
+          </a:blip>
+          <a:stretch>
+            <a:fillRect/>
+          </a:stretch>
+        </p:blipFill>
+        <p:spPr>
+          <a:xfrm>
+            <a:off x="633999" y="1440275"/>
+            <a:ext cx="6909801" cy="3714018"/>
+          </a:xfrm>
+          <a:prstGeom prst="rect">
+            <a:avLst/>
+          </a:prstGeom>
+        </p:spPr>
+      </p:pic>
+      <p:cxnSp>
+        <p:nvCxnSpPr>
+          <p:cNvPr id="23" name="Straight Connector 22">
+            <a:extLst>
+              <a:ext uri="{FF2B5EF4-FFF2-40B4-BE49-F238E27FC236}">
+                <a16:creationId xmlns:a16="http://schemas.microsoft.com/office/drawing/2014/main" id="{C947DF4A-614C-4B4C-8B80-E5B9D8E8CFED}"/>
+              </a:ext>
+              <a:ext uri="{C183D7F6-B498-43B3-948B-1728B52AA6E4}">
+                <adec:decorative xmlns:adec="http://schemas.microsoft.com/office/drawing/2017/decorative" val="1"/>
+              </a:ext>
+            </a:extLst>
+          </p:cNvPr>
+          <p:cNvCxnSpPr>
+            <a:cxnSpLocks noGrp="1" noRot="1" noChangeAspect="1" noMove="1" noResize="1" noEditPoints="1" noAdjustHandles="1" noChangeArrowheads="1" noChangeShapeType="1"/>
+          </p:cNvCxnSpPr>
+          <p:nvPr>
+            <p:extLst>
+              <p:ext uri="{386F3935-93C4-4BCD-93E2-E3B085C9AB24}">
+                <p16:designElem xmlns:p16="http://schemas.microsoft.com/office/powerpoint/2015/main" val="1"/>
+              </p:ext>
+            </p:extLst>
+          </p:nvPr>
+        </p:nvCxnSpPr>
+        <p:spPr>
+          <a:xfrm>
+            <a:off x="7892143" y="2085703"/>
+            <a:ext cx="3566160" cy="0"/>
+          </a:xfrm>
+          <a:prstGeom prst="line">
+            <a:avLst/>
+          </a:prstGeom>
+          <a:ln w="6350">
+            <a:solidFill>
+              <a:schemeClr val="tx1">
+                <a:lumMod val="50000"/>
+                <a:lumOff val="50000"/>
+                <a:alpha val="90000"/>
+              </a:schemeClr>
+            </a:solidFill>
+          </a:ln>
+        </p:spPr>
+        <p:style>
+          <a:lnRef idx="1">
+            <a:schemeClr val="accent1"/>
+          </a:lnRef>
+          <a:fillRef idx="0">
+            <a:schemeClr val="accent1"/>
+          </a:fillRef>
+          <a:effectRef idx="0">
+            <a:schemeClr val="accent1"/>
+          </a:effectRef>
+          <a:fontRef idx="minor">
+            <a:schemeClr val="tx1"/>
+          </a:fontRef>
+        </p:style>
+      </p:cxnSp>
       <p:sp>
         <p:nvSpPr>
           <p:cNvPr id="3" name="Content Placeholder 2">
@@ -4348,14 +4519,152 @@
             <p:ph idx="1"/>
           </p:nvPr>
         </p:nvSpPr>
-        <p:spPr/>
-        <p:txBody>
-          <a:bodyPr/>
-          <a:lstStyle/>
-          <a:p>
-            <a:endParaRPr lang="en-US" dirty="0"/>
-          </a:p>
-        </p:txBody>
+        <p:spPr>
+          <a:xfrm>
+            <a:off x="7859485" y="2198914"/>
+            <a:ext cx="3690257" cy="3670180"/>
+          </a:xfrm>
+        </p:spPr>
+        <p:txBody>
+          <a:bodyPr>
+            <a:normAutofit/>
+          </a:bodyPr>
+          <a:lstStyle/>
+          <a:p>
+            <a:r>
+              <a:rPr lang="en-US" dirty="0"/>
+              <a:t>Do things really change?</a:t>
+            </a:r>
+          </a:p>
+          <a:p>
+            <a:r>
+              <a:rPr lang="en-US" dirty="0"/>
+              <a:t>Or are changes additional information (facts) that happen over a sequence of time?</a:t>
+            </a:r>
+          </a:p>
+          <a:p>
+            <a:r>
+              <a:rPr lang="en-US" dirty="0"/>
+              <a:t>- UPDATE in place is BAD</a:t>
+            </a:r>
+          </a:p>
+          <a:p>
+            <a:r>
+              <a:rPr lang="en-US" dirty="0"/>
+              <a:t>- Forces the database to take on too much responsibility </a:t>
+            </a:r>
+          </a:p>
+        </p:txBody>
+      </p:sp>
+      <p:sp>
+        <p:nvSpPr>
+          <p:cNvPr id="25" name="Rectangle 24">
+            <a:extLst>
+              <a:ext uri="{FF2B5EF4-FFF2-40B4-BE49-F238E27FC236}">
+                <a16:creationId xmlns:a16="http://schemas.microsoft.com/office/drawing/2014/main" id="{1E299956-A9E7-4FC1-A0B1-D590CA9730E8}"/>
+              </a:ext>
+              <a:ext uri="{C183D7F6-B498-43B3-948B-1728B52AA6E4}">
+                <adec:decorative xmlns:adec="http://schemas.microsoft.com/office/drawing/2017/decorative" val="1"/>
+              </a:ext>
+            </a:extLst>
+          </p:cNvPr>
+          <p:cNvSpPr>
+            <a:spLocks noGrp="1" noRot="1" noChangeAspect="1" noMove="1" noResize="1" noEditPoints="1" noAdjustHandles="1" noChangeArrowheads="1" noChangeShapeType="1" noTextEdit="1"/>
+          </p:cNvSpPr>
+          <p:nvPr>
+            <p:extLst>
+              <p:ext uri="{386F3935-93C4-4BCD-93E2-E3B085C9AB24}">
+                <p16:designElem xmlns:p16="http://schemas.microsoft.com/office/powerpoint/2015/main" val="1"/>
+              </p:ext>
+            </p:extLst>
+          </p:nvPr>
+        </p:nvSpPr>
+        <p:spPr>
+          <a:xfrm>
+            <a:off x="15" y="6334316"/>
+            <a:ext cx="12191985" cy="66484"/>
+          </a:xfrm>
+          <a:prstGeom prst="rect">
+            <a:avLst/>
+          </a:prstGeom>
+          <a:solidFill>
+            <a:schemeClr val="accent1"/>
+          </a:solidFill>
+          <a:ln>
+            <a:noFill/>
+          </a:ln>
+        </p:spPr>
+        <p:style>
+          <a:lnRef idx="2">
+            <a:schemeClr val="accent1">
+              <a:shade val="50000"/>
+            </a:schemeClr>
+          </a:lnRef>
+          <a:fillRef idx="1">
+            <a:schemeClr val="accent1"/>
+          </a:fillRef>
+          <a:effectRef idx="0">
+            <a:schemeClr val="accent1"/>
+          </a:effectRef>
+          <a:fontRef idx="minor">
+            <a:schemeClr val="lt1"/>
+          </a:fontRef>
+        </p:style>
+      </p:sp>
+      <p:sp>
+        <p:nvSpPr>
+          <p:cNvPr id="27" name="Rectangle 26">
+            <a:extLst>
+              <a:ext uri="{FF2B5EF4-FFF2-40B4-BE49-F238E27FC236}">
+                <a16:creationId xmlns:a16="http://schemas.microsoft.com/office/drawing/2014/main" id="{17FC539C-B783-4B03-9F9E-D13430F3F64F}"/>
+              </a:ext>
+              <a:ext uri="{C183D7F6-B498-43B3-948B-1728B52AA6E4}">
+                <adec:decorative xmlns:adec="http://schemas.microsoft.com/office/drawing/2017/decorative" val="1"/>
+              </a:ext>
+            </a:extLst>
+          </p:cNvPr>
+          <p:cNvSpPr>
+            <a:spLocks noGrp="1" noRot="1" noChangeAspect="1" noMove="1" noResize="1" noEditPoints="1" noAdjustHandles="1" noChangeArrowheads="1" noChangeShapeType="1" noTextEdit="1"/>
+          </p:cNvSpPr>
+          <p:nvPr>
+            <p:extLst>
+              <p:ext uri="{386F3935-93C4-4BCD-93E2-E3B085C9AB24}">
+                <p16:designElem xmlns:p16="http://schemas.microsoft.com/office/powerpoint/2015/main" val="1"/>
+              </p:ext>
+            </p:extLst>
+          </p:nvPr>
+        </p:nvSpPr>
+        <p:spPr>
+          <a:xfrm>
+            <a:off x="1" y="6400800"/>
+            <a:ext cx="12192000" cy="457200"/>
+          </a:xfrm>
+          <a:prstGeom prst="rect">
+            <a:avLst/>
+          </a:prstGeom>
+          <a:solidFill>
+            <a:schemeClr val="accent2"/>
+          </a:solidFill>
+          <a:ln>
+            <a:noFill/>
+          </a:ln>
+        </p:spPr>
+        <p:style>
+          <a:lnRef idx="2">
+            <a:schemeClr val="accent1">
+              <a:shade val="50000"/>
+            </a:schemeClr>
+          </a:lnRef>
+          <a:fillRef idx="1">
+            <a:schemeClr val="accent1"/>
+          </a:fillRef>
+          <a:effectRef idx="0">
+            <a:schemeClr val="accent1"/>
+          </a:effectRef>
+          <a:fontRef idx="minor">
+            <a:schemeClr val="lt1"/>
+          </a:fontRef>
+        </p:style>
       </p:sp>
     </p:spTree>
     <p:extLst>
@@ -4373,6 +4682,14 @@
 <file path=ppt/slides/slide5.xml><?xml version="1.0" encoding="utf-8"?>
 <p:sld xmlns:a="http://schemas.openxmlformats.org/drawingml/2006/main" xmlns:r="http://schemas.openxmlformats.org/officeDocument/2006/relationships" xmlns:p="http://schemas.openxmlformats.org/presentationml/2006/main">
   <p:cSld>
+    <p:bg>
+      <p:bgPr>
+        <a:solidFill>
+          <a:schemeClr val="bg1"/>
+        </a:solidFill>
+        <a:effectLst/>
+      </p:bgPr>
+    </p:bg>
     <p:spTree>
       <p:nvGrpSpPr>
         <p:cNvPr id="1" name=""/>
@@ -4387,6 +4704,379 @@
           <a:chExt cx="0" cy="0"/>
         </a:xfrm>
       </p:grpSpPr>
+      <p:sp useBgFill="1">
+        <p:nvSpPr>
+          <p:cNvPr id="71" name="Rectangle 70">
+            <a:extLst>
+              <a:ext uri="{FF2B5EF4-FFF2-40B4-BE49-F238E27FC236}">
+                <a16:creationId xmlns:a16="http://schemas.microsoft.com/office/drawing/2014/main" id="{52ABB703-2B0E-4C3B-B4A2-F3973548E561}"/>
+              </a:ext>
+              <a:ext uri="{C183D7F6-B498-43B3-948B-1728B52AA6E4}">
+                <adec:decorative xmlns:adec="http://schemas.microsoft.com/office/drawing/2017/decorative" val="1"/>
+              </a:ext>
+            </a:extLst>
+          </p:cNvPr>
+          <p:cNvSpPr>
+            <a:spLocks noGrp="1" noRot="1" noChangeAspect="1" noMove="1" noResize="1" noEditPoints="1" noAdjustHandles="1" noChangeArrowheads="1" noChangeShapeType="1" noTextEdit="1"/>
+          </p:cNvSpPr>
+          <p:nvPr>
+            <p:extLst>
+              <p:ext uri="{386F3935-93C4-4BCD-93E2-E3B085C9AB24}">
+                <p16:designElem xmlns:p16="http://schemas.microsoft.com/office/powerpoint/2015/main" val="1"/>
+              </p:ext>
+            </p:extLst>
+          </p:nvPr>
+        </p:nvSpPr>
+        <p:spPr>
+          <a:xfrm>
+            <a:off x="0" y="0"/>
+            <a:ext cx="12192001" cy="6334316"/>
+          </a:xfrm>
+          <a:prstGeom prst="rect">
+            <a:avLst/>
+          </a:prstGeom>
+          <a:ln>
+            <a:noFill/>
+          </a:ln>
+        </p:spPr>
+        <p:style>
+          <a:lnRef idx="2">
+            <a:schemeClr val="accent1">
+              <a:shade val="50000"/>
+            </a:schemeClr>
+          </a:lnRef>
+          <a:fillRef idx="1">
+            <a:schemeClr val="accent1"/>
+          </a:fillRef>
+          <a:effectRef idx="0">
+            <a:schemeClr val="accent1"/>
+          </a:effectRef>
+          <a:fontRef idx="minor">
+            <a:schemeClr val="lt1"/>
+          </a:fontRef>
+        </p:style>
+        <p:txBody>
+          <a:bodyPr rtlCol="0" anchor="ctr"/>
+          <a:lstStyle/>
+          <a:p>
+            <a:pPr algn="ctr"/>
+            <a:endParaRPr lang="en-US"/>
+          </a:p>
+        </p:txBody>
+      </p:sp>
+      <p:sp>
+        <p:nvSpPr>
+          <p:cNvPr id="2" name="Title 1">
+            <a:extLst>
+              <a:ext uri="{FF2B5EF4-FFF2-40B4-BE49-F238E27FC236}">
+                <a16:creationId xmlns:a16="http://schemas.microsoft.com/office/drawing/2014/main" id="{950162EC-A965-4272-9707-B779D2540886}"/>
+              </a:ext>
+            </a:extLst>
+          </p:cNvPr>
+          <p:cNvSpPr>
+            <a:spLocks noGrp="1"/>
+          </p:cNvSpPr>
+          <p:nvPr>
+            <p:ph type="title"/>
+          </p:nvPr>
+        </p:nvSpPr>
+        <p:spPr>
+          <a:xfrm>
+            <a:off x="6411685" y="634946"/>
+            <a:ext cx="5127171" cy="1450757"/>
+          </a:xfrm>
+        </p:spPr>
+        <p:txBody>
+          <a:bodyPr>
+            <a:normAutofit/>
+          </a:bodyPr>
+          <a:lstStyle/>
+          <a:p>
+            <a:r>
+              <a:rPr lang="en-US" dirty="0"/>
+              <a:t>Current Architecture</a:t>
+            </a:r>
+          </a:p>
+        </p:txBody>
+      </p:sp>
+      <p:pic>
+        <p:nvPicPr>
+          <p:cNvPr id="1026" name="Picture 2" descr="https://lh5.googleusercontent.com/rSk3S1pd8PhzqhjEBtk5BVNuRMkSmithP_XZyXUDabtCnmGQxIfhSeZEaXFVTw3rBjVViTbO-lw8RGhypPyRRX4Vhdj66_9gonkQgKgZVY58LUjCRRzKuU63KNft7Xdy1QeLs-_kMVU">
+            <a:extLst>
+              <a:ext uri="{FF2B5EF4-FFF2-40B4-BE49-F238E27FC236}">
+                <a16:creationId xmlns:a16="http://schemas.microsoft.com/office/drawing/2014/main" id="{3E35A08D-A0B1-433F-841B-5395E4DDE0C6}"/>
+              </a:ext>
+            </a:extLst>
+          </p:cNvPr>
+          <p:cNvPicPr>
+            <a:picLocks noChangeAspect="1" noChangeArrowheads="1"/>
+          </p:cNvPicPr>
+          <p:nvPr/>
+        </p:nvPicPr>
+        <p:blipFill>
+          <a:blip r:embed="rId2">
+            <a:extLst>
+              <a:ext uri="{28A0092B-C50C-407E-A947-70E740481C1C}">
+                <a14:useLocalDpi xmlns:a14="http://schemas.microsoft.com/office/drawing/2010/main" val="0"/>
+              </a:ext>
+            </a:extLst>
+          </a:blip>
+          <a:srcRect/>
+          <a:stretch>
+            <a:fillRect/>
+          </a:stretch>
+        </p:blipFill>
+        <p:spPr bwMode="auto">
+          <a:xfrm>
+            <a:off x="1925875" y="645106"/>
+            <a:ext cx="2886260" cy="5247747"/>
+          </a:xfrm>
+          <a:prstGeom prst="rect">
+            <a:avLst/>
+          </a:prstGeom>
+          <a:noFill/>
+          <a:extLst>
+            <a:ext uri="{909E8E84-426E-40DD-AFC4-6F175D3DCCD1}">
+              <a14:hiddenFill xmlns:a14="http://schemas.microsoft.com/office/drawing/2010/main">
+                <a:solidFill>
+                  <a:srgbClr val="FFFFFF"/>
+                </a:solidFill>
+              </a14:hiddenFill>
+            </a:ext>
+          </a:extLst>
+        </p:spPr>
+      </p:pic>
+      <p:cxnSp>
+        <p:nvCxnSpPr>
+          <p:cNvPr id="73" name="Straight Connector 72">
+            <a:extLst>
+              <a:ext uri="{FF2B5EF4-FFF2-40B4-BE49-F238E27FC236}">
+                <a16:creationId xmlns:a16="http://schemas.microsoft.com/office/drawing/2014/main" id="{9C21570E-E159-49A6-9891-FA397B7A92D3}"/>
+              </a:ext>
+              <a:ext uri="{C183D7F6-B498-43B3-948B-1728B52AA6E4}">
+                <adec:decorative xmlns:adec="http://schemas.microsoft.com/office/drawing/2017/decorative" val="1"/>
+              </a:ext>
+            </a:extLst>
+          </p:cNvPr>
+          <p:cNvCxnSpPr>
+            <a:cxnSpLocks noGrp="1" noRot="1" noChangeAspect="1" noMove="1" noResize="1" noEditPoints="1" noAdjustHandles="1" noChangeArrowheads="1" noChangeShapeType="1"/>
+          </p:cNvCxnSpPr>
+          <p:nvPr>
+            <p:extLst>
+              <p:ext uri="{386F3935-93C4-4BCD-93E2-E3B085C9AB24}">
+                <p16:designElem xmlns:p16="http://schemas.microsoft.com/office/powerpoint/2015/main" val="1"/>
+              </p:ext>
+            </p:extLst>
+          </p:nvPr>
+        </p:nvCxnSpPr>
+        <p:spPr>
+          <a:xfrm>
+            <a:off x="6411684" y="2086188"/>
+            <a:ext cx="4748808" cy="0"/>
+          </a:xfrm>
+          <a:prstGeom prst="line">
+            <a:avLst/>
+          </a:prstGeom>
+          <a:ln w="6350">
+            <a:solidFill>
+              <a:schemeClr val="tx1">
+                <a:lumMod val="50000"/>
+                <a:lumOff val="50000"/>
+                <a:alpha val="90000"/>
+              </a:schemeClr>
+            </a:solidFill>
+          </a:ln>
+        </p:spPr>
+        <p:style>
+          <a:lnRef idx="1">
+            <a:schemeClr val="accent1"/>
+          </a:lnRef>
+          <a:fillRef idx="0">
+            <a:schemeClr val="accent1"/>
+          </a:fillRef>
+          <a:effectRef idx="0">
+            <a:schemeClr val="accent1"/>
+          </a:effectRef>
+          <a:fontRef idx="minor">
+            <a:schemeClr val="tx1"/>
+          </a:fontRef>
+        </p:style>
+      </p:cxnSp>
+      <p:sp>
+        <p:nvSpPr>
+          <p:cNvPr id="3" name="Content Placeholder 2">
+            <a:extLst>
+              <a:ext uri="{FF2B5EF4-FFF2-40B4-BE49-F238E27FC236}">
+                <a16:creationId xmlns:a16="http://schemas.microsoft.com/office/drawing/2014/main" id="{404C6011-ECB3-41FD-89EB-6E52841D6A1E}"/>
+              </a:ext>
+            </a:extLst>
+          </p:cNvPr>
+          <p:cNvSpPr>
+            <a:spLocks noGrp="1"/>
+          </p:cNvSpPr>
+          <p:nvPr>
+            <p:ph idx="1"/>
+          </p:nvPr>
+        </p:nvSpPr>
+        <p:spPr>
+          <a:xfrm>
+            <a:off x="6411684" y="2198914"/>
+            <a:ext cx="5127172" cy="3670180"/>
+          </a:xfrm>
+        </p:spPr>
+        <p:txBody>
+          <a:bodyPr>
+            <a:normAutofit/>
+          </a:bodyPr>
+          <a:lstStyle/>
+          <a:p>
+            <a:r>
+              <a:rPr lang="en-US" dirty="0"/>
+              <a:t>Database is doing too many things</a:t>
+            </a:r>
+          </a:p>
+        </p:txBody>
+      </p:sp>
+      <p:sp>
+        <p:nvSpPr>
+          <p:cNvPr id="75" name="Rectangle 74">
+            <a:extLst>
+              <a:ext uri="{FF2B5EF4-FFF2-40B4-BE49-F238E27FC236}">
+                <a16:creationId xmlns:a16="http://schemas.microsoft.com/office/drawing/2014/main" id="{E95DA498-D9A2-4DA9-B9DA-B3776E08CF7E}"/>
+              </a:ext>
+              <a:ext uri="{C183D7F6-B498-43B3-948B-1728B52AA6E4}">
+                <adec:decorative xmlns:adec="http://schemas.microsoft.com/office/drawing/2017/decorative" val="1"/>
+              </a:ext>
+            </a:extLst>
+          </p:cNvPr>
+          <p:cNvSpPr>
+            <a:spLocks noGrp="1" noRot="1" noChangeAspect="1" noMove="1" noResize="1" noEditPoints="1" noAdjustHandles="1" noChangeArrowheads="1" noChangeShapeType="1" noTextEdit="1"/>
+          </p:cNvSpPr>
+          <p:nvPr>
+            <p:extLst>
+              <p:ext uri="{386F3935-93C4-4BCD-93E2-E3B085C9AB24}">
+                <p16:designElem xmlns:p16="http://schemas.microsoft.com/office/powerpoint/2015/main" val="1"/>
+              </p:ext>
+            </p:extLst>
+          </p:nvPr>
+        </p:nvSpPr>
+        <p:spPr>
+          <a:xfrm>
+            <a:off x="15" y="6334316"/>
+            <a:ext cx="12191985" cy="66484"/>
+          </a:xfrm>
+          <a:prstGeom prst="rect">
+            <a:avLst/>
+          </a:prstGeom>
+          <a:solidFill>
+            <a:schemeClr val="accent1"/>
+          </a:solidFill>
+          <a:ln>
+            <a:noFill/>
+          </a:ln>
+        </p:spPr>
+        <p:style>
+          <a:lnRef idx="2">
+            <a:schemeClr val="accent1">
+              <a:shade val="50000"/>
+            </a:schemeClr>
+          </a:lnRef>
+          <a:fillRef idx="1">
+            <a:schemeClr val="accent1"/>
+          </a:fillRef>
+          <a:effectRef idx="0">
+            <a:schemeClr val="accent1"/>
+          </a:effectRef>
+          <a:fontRef idx="minor">
+            <a:schemeClr val="lt1"/>
+          </a:fontRef>
+        </p:style>
+      </p:sp>
+      <p:sp>
+        <p:nvSpPr>
+          <p:cNvPr id="77" name="Rectangle 76">
+            <a:extLst>
+              <a:ext uri="{FF2B5EF4-FFF2-40B4-BE49-F238E27FC236}">
+                <a16:creationId xmlns:a16="http://schemas.microsoft.com/office/drawing/2014/main" id="{82A73093-4B9D-420D-B17E-52293703A1D4}"/>
+              </a:ext>
+              <a:ext uri="{C183D7F6-B498-43B3-948B-1728B52AA6E4}">
+                <adec:decorative xmlns:adec="http://schemas.microsoft.com/office/drawing/2017/decorative" val="1"/>
+              </a:ext>
+            </a:extLst>
+          </p:cNvPr>
+          <p:cNvSpPr>
+            <a:spLocks noGrp="1" noRot="1" noChangeAspect="1" noMove="1" noResize="1" noEditPoints="1" noAdjustHandles="1" noChangeArrowheads="1" noChangeShapeType="1" noTextEdit="1"/>
+          </p:cNvSpPr>
+          <p:nvPr>
+            <p:extLst>
+              <p:ext uri="{386F3935-93C4-4BCD-93E2-E3B085C9AB24}">
+                <p16:designElem xmlns:p16="http://schemas.microsoft.com/office/powerpoint/2015/main" val="1"/>
+              </p:ext>
+            </p:extLst>
+          </p:nvPr>
+        </p:nvSpPr>
+        <p:spPr>
+          <a:xfrm>
+            <a:off x="1" y="6400800"/>
+            <a:ext cx="12192000" cy="457200"/>
+          </a:xfrm>
+          <a:prstGeom prst="rect">
+            <a:avLst/>
+          </a:prstGeom>
+          <a:solidFill>
+            <a:schemeClr val="accent2"/>
+          </a:solidFill>
+          <a:ln>
+            <a:noFill/>
+          </a:ln>
+        </p:spPr>
+        <p:style>
+          <a:lnRef idx="2">
+            <a:schemeClr val="accent1">
+              <a:shade val="50000"/>
+            </a:schemeClr>
+          </a:lnRef>
+          <a:fillRef idx="1">
+            <a:schemeClr val="accent1"/>
+          </a:fillRef>
+          <a:effectRef idx="0">
+            <a:schemeClr val="accent1"/>
+          </a:effectRef>
+          <a:fontRef idx="minor">
+            <a:schemeClr val="lt1"/>
+          </a:fontRef>
+        </p:style>
+      </p:sp>
+    </p:spTree>
+    <p:extLst>
+      <p:ext uri="{BB962C8B-B14F-4D97-AF65-F5344CB8AC3E}">
+        <p14:creationId xmlns:p14="http://schemas.microsoft.com/office/powerpoint/2010/main" val="1521376530"/>
+      </p:ext>
+    </p:extLst>
+  </p:cSld>
+  <p:clrMapOvr>
+    <a:masterClrMapping/>
+  </p:clrMapOvr>
+</p:sld>
+</file>
+
+<file path=ppt/slides/slide6.xml><?xml version="1.0" encoding="utf-8"?>
+<p:sld xmlns:a="http://schemas.openxmlformats.org/drawingml/2006/main" xmlns:r="http://schemas.openxmlformats.org/officeDocument/2006/relationships" xmlns:p="http://schemas.openxmlformats.org/presentationml/2006/main">
+  <p:cSld>
+    <p:spTree>
+      <p:nvGrpSpPr>
+        <p:cNvPr id="1" name=""/>
+        <p:cNvGrpSpPr/>
+        <p:nvPr/>
+      </p:nvGrpSpPr>
+      <p:grpSpPr>
+        <a:xfrm>
+          <a:off x="0" y="0"/>
+          <a:ext cx="0" cy="0"/>
+          <a:chOff x="0" y="0"/>
+          <a:chExt cx="0" cy="0"/>
+        </a:xfrm>
+      </p:grpSpPr>
       <p:sp>
         <p:nvSpPr>
           <p:cNvPr id="2" name="Title 1">
@@ -4465,7 +5155,7 @@
 </p:sld>
 </file>
 
-<file path=ppt/slides/slide6.xml><?xml version="1.0" encoding="utf-8"?>
+<file path=ppt/slides/slide7.xml><?xml version="1.0" encoding="utf-8"?>
 <p:sld xmlns:a="http://schemas.openxmlformats.org/drawingml/2006/main" xmlns:r="http://schemas.openxmlformats.org/officeDocument/2006/relationships" xmlns:p="http://schemas.openxmlformats.org/presentationml/2006/main">
   <p:cSld>
     <p:spTree>

</xml_diff>

<commit_message>
Updated placement of slides
</commit_message>
<xml_diff>
--- a/rosp.pptx
+++ b/rosp.pptx
@@ -7,9 +7,9 @@
   <p:sldIdLst>
     <p:sldId id="256" r:id="rId2"/>
     <p:sldId id="257" r:id="rId3"/>
-    <p:sldId id="259" r:id="rId4"/>
+    <p:sldId id="262" r:id="rId4"/>
     <p:sldId id="258" r:id="rId5"/>
-    <p:sldId id="262" r:id="rId6"/>
+    <p:sldId id="259" r:id="rId6"/>
     <p:sldId id="260" r:id="rId7"/>
     <p:sldId id="261" r:id="rId8"/>
   </p:sldIdLst>
@@ -116,6 +116,57 @@
     </p:ext>
   </p:extLst>
 </p:presentation>
+</file>
+
+<file path=ppt/revisionInfo.xml><?xml version="1.0" encoding="utf-8"?>
+<p1510:revInfo xmlns:a="http://schemas.openxmlformats.org/drawingml/2006/main" xmlns:r="http://schemas.openxmlformats.org/officeDocument/2006/relationships" xmlns:p1510="http://schemas.microsoft.com/office/powerpoint/2015/10/main">
+  <p1510:revLst>
+    <p1510:client id="{F6A590FC-77AD-4D64-A055-2FB8CEB1E6D6}" v="3" dt="2019-03-05T15:11:23.274"/>
+  </p1510:revLst>
+</p1510:revInfo>
+</file>
+
+<file path=ppt/changesInfos/changesInfo1.xml><?xml version="1.0" encoding="utf-8"?>
+<pc:chgInfo xmlns:a="http://schemas.openxmlformats.org/drawingml/2006/main" xmlns:r="http://schemas.openxmlformats.org/officeDocument/2006/relationships" xmlns:ac="http://schemas.microsoft.com/office/drawing/2013/main/command" xmlns:pc="http://schemas.microsoft.com/office/powerpoint/2013/main/command">
+  <pc:docChgLst>
+    <pc:chgData name="Tyler Morten" userId="0c572a89dece06f5" providerId="LiveId" clId="{F6A590FC-77AD-4D64-A055-2FB8CEB1E6D6}"/>
+    <pc:docChg chg="custSel modSld sldOrd">
+      <pc:chgData name="Tyler Morten" userId="0c572a89dece06f5" providerId="LiveId" clId="{F6A590FC-77AD-4D64-A055-2FB8CEB1E6D6}" dt="2019-03-05T15:11:35.056" v="81" actId="313"/>
+      <pc:docMkLst>
+        <pc:docMk/>
+      </pc:docMkLst>
+      <pc:sldChg chg="modSp">
+        <pc:chgData name="Tyler Morten" userId="0c572a89dece06f5" providerId="LiveId" clId="{F6A590FC-77AD-4D64-A055-2FB8CEB1E6D6}" dt="2019-03-05T15:11:35.056" v="81" actId="313"/>
+        <pc:sldMkLst>
+          <pc:docMk/>
+          <pc:sldMk cId="2579562272" sldId="257"/>
+        </pc:sldMkLst>
+        <pc:spChg chg="mod">
+          <ac:chgData name="Tyler Morten" userId="0c572a89dece06f5" providerId="LiveId" clId="{F6A590FC-77AD-4D64-A055-2FB8CEB1E6D6}" dt="2019-03-05T15:11:35.056" v="81" actId="313"/>
+          <ac:spMkLst>
+            <pc:docMk/>
+            <pc:sldMk cId="2579562272" sldId="257"/>
+            <ac:spMk id="5" creationId="{7171EC86-F223-45BB-A932-AF77E83C4A3F}"/>
+          </ac:spMkLst>
+        </pc:spChg>
+      </pc:sldChg>
+      <pc:sldChg chg="ord">
+        <pc:chgData name="Tyler Morten" userId="0c572a89dece06f5" providerId="LiveId" clId="{F6A590FC-77AD-4D64-A055-2FB8CEB1E6D6}" dt="2019-03-05T15:10:44.997" v="0"/>
+        <pc:sldMkLst>
+          <pc:docMk/>
+          <pc:sldMk cId="1259622013" sldId="258"/>
+        </pc:sldMkLst>
+      </pc:sldChg>
+      <pc:sldChg chg="ord">
+        <pc:chgData name="Tyler Morten" userId="0c572a89dece06f5" providerId="LiveId" clId="{F6A590FC-77AD-4D64-A055-2FB8CEB1E6D6}" dt="2019-03-05T15:11:23.272" v="59"/>
+        <pc:sldMkLst>
+          <pc:docMk/>
+          <pc:sldMk cId="1521376530" sldId="262"/>
+        </pc:sldMkLst>
+      </pc:sldChg>
+    </pc:docChg>
+  </pc:docChgLst>
+</pc:chgInfo>
 </file>
 
 <file path=ppt/slideLayouts/slideLayout1.xml><?xml version="1.0" encoding="utf-8"?>
@@ -3954,13 +4005,19 @@
           <a:p>
             <a:r>
               <a:rPr lang="en-US" dirty="0"/>
-              <a:t>Distributed Systems</a:t>
+              <a:t>Current Architecture</a:t>
             </a:r>
           </a:p>
           <a:p>
             <a:r>
               <a:rPr lang="en-US" dirty="0"/>
               <a:t>Time and State</a:t>
+            </a:r>
+          </a:p>
+          <a:p>
+            <a:r>
+              <a:rPr lang="en-US" dirty="0"/>
+              <a:t>Distributed Systems</a:t>
             </a:r>
           </a:p>
           <a:p>
@@ -3990,6 +4047,14 @@
 <file path=ppt/slides/slide3.xml><?xml version="1.0" encoding="utf-8"?>
 <p:sld xmlns:a="http://schemas.openxmlformats.org/drawingml/2006/main" xmlns:r="http://schemas.openxmlformats.org/officeDocument/2006/relationships" xmlns:p="http://schemas.openxmlformats.org/presentationml/2006/main">
   <p:cSld>
+    <p:bg>
+      <p:bgPr>
+        <a:solidFill>
+          <a:schemeClr val="bg1"/>
+        </a:solidFill>
+        <a:effectLst/>
+      </p:bgPr>
+    </p:bg>
     <p:spTree>
       <p:nvGrpSpPr>
         <p:cNvPr id="1" name=""/>
@@ -4004,12 +4069,72 @@
           <a:chExt cx="0" cy="0"/>
         </a:xfrm>
       </p:grpSpPr>
+      <p:sp useBgFill="1">
+        <p:nvSpPr>
+          <p:cNvPr id="71" name="Rectangle 70">
+            <a:extLst>
+              <a:ext uri="{FF2B5EF4-FFF2-40B4-BE49-F238E27FC236}">
+                <a16:creationId xmlns:a16="http://schemas.microsoft.com/office/drawing/2014/main" id="{52ABB703-2B0E-4C3B-B4A2-F3973548E561}"/>
+              </a:ext>
+              <a:ext uri="{C183D7F6-B498-43B3-948B-1728B52AA6E4}">
+                <adec:decorative xmlns:adec="http://schemas.microsoft.com/office/drawing/2017/decorative" val="1"/>
+              </a:ext>
+            </a:extLst>
+          </p:cNvPr>
+          <p:cNvSpPr>
+            <a:spLocks noGrp="1" noRot="1" noChangeAspect="1" noMove="1" noResize="1" noEditPoints="1" noAdjustHandles="1" noChangeArrowheads="1" noChangeShapeType="1" noTextEdit="1"/>
+          </p:cNvSpPr>
+          <p:nvPr>
+            <p:extLst>
+              <p:ext uri="{386F3935-93C4-4BCD-93E2-E3B085C9AB24}">
+                <p16:designElem xmlns:p16="http://schemas.microsoft.com/office/powerpoint/2015/main" val="1"/>
+              </p:ext>
+            </p:extLst>
+          </p:nvPr>
+        </p:nvSpPr>
+        <p:spPr>
+          <a:xfrm>
+            <a:off x="0" y="0"/>
+            <a:ext cx="12192001" cy="6334316"/>
+          </a:xfrm>
+          <a:prstGeom prst="rect">
+            <a:avLst/>
+          </a:prstGeom>
+          <a:ln>
+            <a:noFill/>
+          </a:ln>
+        </p:spPr>
+        <p:style>
+          <a:lnRef idx="2">
+            <a:schemeClr val="accent1">
+              <a:shade val="50000"/>
+            </a:schemeClr>
+          </a:lnRef>
+          <a:fillRef idx="1">
+            <a:schemeClr val="accent1"/>
+          </a:fillRef>
+          <a:effectRef idx="0">
+            <a:schemeClr val="accent1"/>
+          </a:effectRef>
+          <a:fontRef idx="minor">
+            <a:schemeClr val="lt1"/>
+          </a:fontRef>
+        </p:style>
+        <p:txBody>
+          <a:bodyPr rtlCol="0" anchor="ctr"/>
+          <a:lstStyle/>
+          <a:p>
+            <a:pPr algn="ctr"/>
+            <a:endParaRPr lang="en-US"/>
+          </a:p>
+        </p:txBody>
+      </p:sp>
       <p:sp>
         <p:nvSpPr>
           <p:cNvPr id="2" name="Title 1">
             <a:extLst>
               <a:ext uri="{FF2B5EF4-FFF2-40B4-BE49-F238E27FC236}">
-                <a16:creationId xmlns:a16="http://schemas.microsoft.com/office/drawing/2014/main" id="{C17ECC18-6FAF-43FF-A499-D5E79827BCE0}"/>
+                <a16:creationId xmlns:a16="http://schemas.microsoft.com/office/drawing/2014/main" id="{950162EC-A965-4272-9707-B779D2540886}"/>
               </a:ext>
             </a:extLst>
           </p:cNvPr>
@@ -4020,24 +4145,134 @@
             <p:ph type="title"/>
           </p:nvPr>
         </p:nvSpPr>
-        <p:spPr/>
-        <p:txBody>
-          <a:bodyPr/>
+        <p:spPr>
+          <a:xfrm>
+            <a:off x="6411685" y="634946"/>
+            <a:ext cx="5127171" cy="1450757"/>
+          </a:xfrm>
+        </p:spPr>
+        <p:txBody>
+          <a:bodyPr>
+            <a:normAutofit/>
+          </a:bodyPr>
           <a:lstStyle/>
           <a:p>
             <a:r>
               <a:rPr lang="en-US" dirty="0"/>
-              <a:t>Distributed Systems</a:t>
-            </a:r>
-          </a:p>
-        </p:txBody>
-      </p:sp>
+              <a:t>Current Architecture</a:t>
+            </a:r>
+          </a:p>
+        </p:txBody>
+      </p:sp>
+      <p:pic>
+        <p:nvPicPr>
+          <p:cNvPr id="1026" name="Picture 2" descr="https://lh5.googleusercontent.com/rSk3S1pd8PhzqhjEBtk5BVNuRMkSmithP_XZyXUDabtCnmGQxIfhSeZEaXFVTw3rBjVViTbO-lw8RGhypPyRRX4Vhdj66_9gonkQgKgZVY58LUjCRRzKuU63KNft7Xdy1QeLs-_kMVU">
+            <a:extLst>
+              <a:ext uri="{FF2B5EF4-FFF2-40B4-BE49-F238E27FC236}">
+                <a16:creationId xmlns:a16="http://schemas.microsoft.com/office/drawing/2014/main" id="{3E35A08D-A0B1-433F-841B-5395E4DDE0C6}"/>
+              </a:ext>
+            </a:extLst>
+          </p:cNvPr>
+          <p:cNvPicPr>
+            <a:picLocks noChangeAspect="1" noChangeArrowheads="1"/>
+          </p:cNvPicPr>
+          <p:nvPr/>
+        </p:nvPicPr>
+        <p:blipFill>
+          <a:blip r:embed="rId2">
+            <a:extLst>
+              <a:ext uri="{28A0092B-C50C-407E-A947-70E740481C1C}">
+                <a14:useLocalDpi xmlns:a14="http://schemas.microsoft.com/office/drawing/2010/main" val="0"/>
+              </a:ext>
+            </a:extLst>
+          </a:blip>
+          <a:srcRect/>
+          <a:stretch>
+            <a:fillRect/>
+          </a:stretch>
+        </p:blipFill>
+        <p:spPr bwMode="auto">
+          <a:xfrm>
+            <a:off x="1925875" y="645106"/>
+            <a:ext cx="2886260" cy="5247747"/>
+          </a:xfrm>
+          <a:prstGeom prst="rect">
+            <a:avLst/>
+          </a:prstGeom>
+          <a:noFill/>
+          <a:extLst>
+            <a:ext uri="{909E8E84-426E-40DD-AFC4-6F175D3DCCD1}">
+              <a14:hiddenFill xmlns:a14="http://schemas.microsoft.com/office/drawing/2010/main">
+                <a:solidFill>
+                  <a:srgbClr val="FFFFFF"/>
+                </a:solidFill>
+              </a14:hiddenFill>
+            </a:ext>
+          </a:extLst>
+        </p:spPr>
+      </p:pic>
+      <p:cxnSp>
+        <p:nvCxnSpPr>
+          <p:cNvPr id="73" name="Straight Connector 72">
+            <a:extLst>
+              <a:ext uri="{FF2B5EF4-FFF2-40B4-BE49-F238E27FC236}">
+                <a16:creationId xmlns:a16="http://schemas.microsoft.com/office/drawing/2014/main" id="{9C21570E-E159-49A6-9891-FA397B7A92D3}"/>
+              </a:ext>
+              <a:ext uri="{C183D7F6-B498-43B3-948B-1728B52AA6E4}">
+                <adec:decorative xmlns:adec="http://schemas.microsoft.com/office/drawing/2017/decorative" val="1"/>
+              </a:ext>
+            </a:extLst>
+          </p:cNvPr>
+          <p:cNvCxnSpPr>
+            <a:cxnSpLocks noGrp="1" noRot="1" noChangeAspect="1" noMove="1" noResize="1" noEditPoints="1" noAdjustHandles="1" noChangeArrowheads="1" noChangeShapeType="1"/>
+          </p:cNvCxnSpPr>
+          <p:nvPr>
+            <p:extLst>
+              <p:ext uri="{386F3935-93C4-4BCD-93E2-E3B085C9AB24}">
+                <p16:designElem xmlns:p16="http://schemas.microsoft.com/office/powerpoint/2015/main" val="1"/>
+              </p:ext>
+            </p:extLst>
+          </p:nvPr>
+        </p:nvCxnSpPr>
+        <p:spPr>
+          <a:xfrm>
+            <a:off x="6411684" y="2086188"/>
+            <a:ext cx="4748808" cy="0"/>
+          </a:xfrm>
+          <a:prstGeom prst="line">
+            <a:avLst/>
+          </a:prstGeom>
+          <a:ln w="6350">
+            <a:solidFill>
+              <a:schemeClr val="tx1">
+                <a:lumMod val="50000"/>
+                <a:lumOff val="50000"/>
+                <a:alpha val="90000"/>
+              </a:schemeClr>
+            </a:solidFill>
+          </a:ln>
+        </p:spPr>
+        <p:style>
+          <a:lnRef idx="1">
+            <a:schemeClr val="accent1"/>
+          </a:lnRef>
+          <a:fillRef idx="0">
+            <a:schemeClr val="accent1"/>
+          </a:fillRef>
+          <a:effectRef idx="0">
+            <a:schemeClr val="accent1"/>
+          </a:effectRef>
+          <a:fontRef idx="minor">
+            <a:schemeClr val="tx1"/>
+          </a:fontRef>
+        </p:style>
+      </p:cxnSp>
       <p:sp>
         <p:nvSpPr>
           <p:cNvPr id="3" name="Content Placeholder 2">
             <a:extLst>
               <a:ext uri="{FF2B5EF4-FFF2-40B4-BE49-F238E27FC236}">
-                <a16:creationId xmlns:a16="http://schemas.microsoft.com/office/drawing/2014/main" id="{81DFDCA9-C3C0-4F49-A7F4-318F150DD54B}"/>
+                <a16:creationId xmlns:a16="http://schemas.microsoft.com/office/drawing/2014/main" id="{404C6011-ECB3-41FD-89EB-6E52841D6A1E}"/>
               </a:ext>
             </a:extLst>
           </p:cNvPr>
@@ -4048,237 +4283,139 @@
             <p:ph idx="1"/>
           </p:nvPr>
         </p:nvSpPr>
-        <p:spPr/>
-        <p:txBody>
-          <a:bodyPr vert="horz" lIns="0" tIns="45720" rIns="0" bIns="45720" rtlCol="0" anchor="t">
-            <a:normAutofit lnSpcReduction="10000"/>
+        <p:spPr>
+          <a:xfrm>
+            <a:off x="6411684" y="2198914"/>
+            <a:ext cx="5127172" cy="3670180"/>
+          </a:xfrm>
+        </p:spPr>
+        <p:txBody>
+          <a:bodyPr>
+            <a:normAutofit/>
           </a:bodyPr>
           <a:lstStyle/>
           <a:p>
-            <a:pPr>
-              <a:buFont typeface="Arial" panose="020F0502020204030204" pitchFamily="34" charset="0"/>
-              <a:buChar char="•"/>
-            </a:pPr>
-            <a:r>
-              <a:rPr lang="en-US" dirty="0">
-                <a:cs typeface="Calibri"/>
-              </a:rPr>
-              <a:t>A series of network coordinated servers/nodes that can share request load</a:t>
-            </a:r>
-          </a:p>
-          <a:p>
-            <a:pPr marL="383540" lvl="1">
-              <a:buFont typeface="Arial" panose="020F0502020204030204" pitchFamily="34" charset="0"/>
-              <a:buChar char="•"/>
-            </a:pPr>
-            <a:r>
-              <a:rPr lang="en-US" dirty="0">
-                <a:cs typeface="Calibri"/>
-              </a:rPr>
-              <a:t>Can scale on demand ("Horizontal Scaling / Scale Out")</a:t>
-            </a:r>
-            <a:endParaRPr lang="en-US" dirty="0"/>
-          </a:p>
-          <a:p>
-            <a:pPr>
-              <a:buFont typeface="Arial,Sans-Serif" panose="020F0502020204030204" pitchFamily="34" charset="0"/>
-              <a:buChar char="•"/>
-            </a:pPr>
-            <a:r>
-              <a:rPr lang="en-US" dirty="0">
-                <a:cs typeface="Calibri"/>
-              </a:rPr>
-              <a:t>Reads separated from writes</a:t>
-            </a:r>
-          </a:p>
-          <a:p>
-            <a:pPr marL="383540" lvl="1">
-              <a:buFont typeface="Arial,Sans-Serif" panose="020F0502020204030204" pitchFamily="34" charset="0"/>
-              <a:buChar char="•"/>
-            </a:pPr>
-            <a:r>
-              <a:rPr lang="en-US" dirty="0">
-                <a:cs typeface="Calibri"/>
-              </a:rPr>
-              <a:t>Data is consistent within version of database</a:t>
-            </a:r>
-          </a:p>
-          <a:p>
-            <a:pPr marL="383540" lvl="1">
-              <a:buFont typeface="Arial,Sans-Serif" panose="020F0502020204030204" pitchFamily="34" charset="0"/>
-              <a:buChar char="•"/>
-            </a:pPr>
-            <a:r>
-              <a:rPr lang="en-US" dirty="0">
-                <a:cs typeface="Calibri"/>
-              </a:rPr>
-              <a:t>Timestamped transactions</a:t>
-            </a:r>
-          </a:p>
-          <a:p>
-            <a:pPr>
-              <a:buFont typeface="Arial,Sans-Serif" panose="020F0502020204030204" pitchFamily="34" charset="0"/>
-              <a:buChar char="•"/>
-            </a:pPr>
-            <a:r>
-              <a:rPr lang="en-US" dirty="0">
-                <a:cs typeface="Calibri"/>
-              </a:rPr>
-              <a:t>Single </a:t>
-            </a:r>
-            <a:r>
-              <a:rPr lang="en-US" dirty="0" err="1">
-                <a:cs typeface="Calibri"/>
-              </a:rPr>
-              <a:t>Transactor</a:t>
-            </a:r>
-            <a:r>
-              <a:rPr lang="en-US" dirty="0">
-                <a:cs typeface="Calibri"/>
-              </a:rPr>
-              <a:t> for writes</a:t>
-            </a:r>
-          </a:p>
-          <a:p>
-            <a:pPr>
-              <a:buFont typeface="Arial,Sans-Serif" panose="020F0502020204030204" pitchFamily="34" charset="0"/>
-              <a:buChar char="•"/>
-            </a:pPr>
-            <a:r>
-              <a:rPr lang="en-US" dirty="0">
-                <a:cs typeface="Calibri"/>
-              </a:rPr>
-              <a:t>Peers made aware of newer versions of </a:t>
-            </a:r>
-            <a:r>
-              <a:rPr lang="en-US" dirty="0" err="1">
-                <a:cs typeface="Calibri"/>
-              </a:rPr>
-              <a:t>db</a:t>
-            </a:r>
-            <a:r>
-              <a:rPr lang="en-US" dirty="0">
-                <a:cs typeface="Calibri"/>
-              </a:rPr>
-              <a:t> as writes occur</a:t>
-            </a:r>
-          </a:p>
-          <a:p>
-            <a:pPr marL="383540" lvl="1">
-              <a:buFont typeface="Arial,Sans-Serif" panose="020F0502020204030204" pitchFamily="34" charset="0"/>
-              <a:buChar char="•"/>
-            </a:pPr>
-            <a:r>
-              <a:rPr lang="en-US" dirty="0">
-                <a:cs typeface="Calibri"/>
-              </a:rPr>
-              <a:t>Free to query latest or a specific version</a:t>
-            </a:r>
-            <a:endParaRPr lang="en-US" dirty="0"/>
-          </a:p>
-          <a:p>
-            <a:pPr>
-              <a:buFont typeface="Arial" panose="020F0502020204030204" pitchFamily="34" charset="0"/>
-              <a:buChar char="•"/>
-            </a:pPr>
-            <a:r>
-              <a:rPr lang="en-US" dirty="0">
-                <a:cs typeface="Calibri"/>
-              </a:rPr>
-              <a:t>Caches "warmed" to calls from region</a:t>
-            </a:r>
-            <a:endParaRPr lang="en-US" dirty="0"/>
-          </a:p>
-          <a:p>
-            <a:pPr marL="383540" lvl="1">
-              <a:buFont typeface="Arial" panose="020F0502020204030204" pitchFamily="34" charset="0"/>
-              <a:buChar char="•"/>
-            </a:pPr>
-            <a:r>
-              <a:rPr lang="en-US" dirty="0">
-                <a:cs typeface="Calibri"/>
-              </a:rPr>
-              <a:t>No need to hit storage if you have local copy of </a:t>
-            </a:r>
-            <a:r>
-              <a:rPr lang="en-US" dirty="0" err="1">
-                <a:cs typeface="Calibri"/>
-              </a:rPr>
-              <a:t>db</a:t>
-            </a:r>
-          </a:p>
-          <a:p>
-            <a:pPr marL="383540" lvl="1">
-              <a:buFont typeface="Arial" panose="020F0502020204030204" pitchFamily="34" charset="0"/>
-              <a:buChar char="•"/>
-            </a:pPr>
-            <a:r>
-              <a:rPr lang="en-US" dirty="0">
-                <a:cs typeface="Calibri"/>
-              </a:rPr>
-              <a:t>Peers can be specialized for certain roles (Catalog / Analytics) </a:t>
-            </a:r>
-          </a:p>
-          <a:p>
-            <a:pPr>
-              <a:buFont typeface="Arial" panose="020F0502020204030204" pitchFamily="34" charset="0"/>
-              <a:buChar char="•"/>
-            </a:pPr>
-            <a:endParaRPr lang="en-US" dirty="0">
-              <a:cs typeface="Calibri"/>
-            </a:endParaRPr>
-          </a:p>
-          <a:p>
-            <a:pPr>
-              <a:buFont typeface="Arial" panose="020F0502020204030204" pitchFamily="34" charset="0"/>
-              <a:buChar char="•"/>
-            </a:pPr>
-            <a:endParaRPr lang="en-US" dirty="0">
-              <a:cs typeface="Calibri"/>
-            </a:endParaRPr>
-          </a:p>
-          <a:p>
-            <a:pPr>
-              <a:buFont typeface="Arial" panose="020F0502020204030204" pitchFamily="34" charset="0"/>
-              <a:buChar char="•"/>
-            </a:pPr>
-            <a:endParaRPr lang="en-US" dirty="0">
-              <a:cs typeface="Calibri"/>
-            </a:endParaRPr>
-          </a:p>
-          <a:p>
-            <a:pPr marL="383540" lvl="1">
-              <a:buFont typeface="Arial" panose="020F0502020204030204" pitchFamily="34" charset="0"/>
-              <a:buChar char="•"/>
-            </a:pPr>
-            <a:endParaRPr lang="en-US" dirty="0">
-              <a:cs typeface="Calibri"/>
-            </a:endParaRPr>
-          </a:p>
-          <a:p>
-            <a:pPr marL="383540" lvl="1">
-              <a:buFont typeface="Arial" panose="020F0502020204030204" pitchFamily="34" charset="0"/>
-              <a:buChar char="•"/>
-            </a:pPr>
-            <a:endParaRPr lang="en-US" dirty="0">
-              <a:cs typeface="Calibri"/>
-            </a:endParaRPr>
-          </a:p>
-          <a:p>
-            <a:pPr>
-              <a:buFont typeface="Arial" panose="020F0502020204030204" pitchFamily="34" charset="0"/>
-              <a:buChar char="•"/>
-            </a:pPr>
-            <a:endParaRPr lang="en-US" dirty="0">
-              <a:cs typeface="Calibri"/>
-            </a:endParaRPr>
-          </a:p>
-        </p:txBody>
+            <a:r>
+              <a:rPr lang="en-US" dirty="0"/>
+              <a:t>Database is doing too many things</a:t>
+            </a:r>
+          </a:p>
+        </p:txBody>
+      </p:sp>
+      <p:sp>
+        <p:nvSpPr>
+          <p:cNvPr id="75" name="Rectangle 74">
+            <a:extLst>
+              <a:ext uri="{FF2B5EF4-FFF2-40B4-BE49-F238E27FC236}">
+                <a16:creationId xmlns:a16="http://schemas.microsoft.com/office/drawing/2014/main" id="{E95DA498-D9A2-4DA9-B9DA-B3776E08CF7E}"/>
+              </a:ext>
+              <a:ext uri="{C183D7F6-B498-43B3-948B-1728B52AA6E4}">
+                <adec:decorative xmlns:adec="http://schemas.microsoft.com/office/drawing/2017/decorative" val="1"/>
+              </a:ext>
+            </a:extLst>
+          </p:cNvPr>
+          <p:cNvSpPr>
+            <a:spLocks noGrp="1" noRot="1" noChangeAspect="1" noMove="1" noResize="1" noEditPoints="1" noAdjustHandles="1" noChangeArrowheads="1" noChangeShapeType="1" noTextEdit="1"/>
+          </p:cNvSpPr>
+          <p:nvPr>
+            <p:extLst>
+              <p:ext uri="{386F3935-93C4-4BCD-93E2-E3B085C9AB24}">
+                <p16:designElem xmlns:p16="http://schemas.microsoft.com/office/powerpoint/2015/main" val="1"/>
+              </p:ext>
+            </p:extLst>
+          </p:nvPr>
+        </p:nvSpPr>
+        <p:spPr>
+          <a:xfrm>
+            <a:off x="15" y="6334316"/>
+            <a:ext cx="12191985" cy="66484"/>
+          </a:xfrm>
+          <a:prstGeom prst="rect">
+            <a:avLst/>
+          </a:prstGeom>
+          <a:solidFill>
+            <a:schemeClr val="accent1"/>
+          </a:solidFill>
+          <a:ln>
+            <a:noFill/>
+          </a:ln>
+        </p:spPr>
+        <p:style>
+          <a:lnRef idx="2">
+            <a:schemeClr val="accent1">
+              <a:shade val="50000"/>
+            </a:schemeClr>
+          </a:lnRef>
+          <a:fillRef idx="1">
+            <a:schemeClr val="accent1"/>
+          </a:fillRef>
+          <a:effectRef idx="0">
+            <a:schemeClr val="accent1"/>
+          </a:effectRef>
+          <a:fontRef idx="minor">
+            <a:schemeClr val="lt1"/>
+          </a:fontRef>
+        </p:style>
+      </p:sp>
+      <p:sp>
+        <p:nvSpPr>
+          <p:cNvPr id="77" name="Rectangle 76">
+            <a:extLst>
+              <a:ext uri="{FF2B5EF4-FFF2-40B4-BE49-F238E27FC236}">
+                <a16:creationId xmlns:a16="http://schemas.microsoft.com/office/drawing/2014/main" id="{82A73093-4B9D-420D-B17E-52293703A1D4}"/>
+              </a:ext>
+              <a:ext uri="{C183D7F6-B498-43B3-948B-1728B52AA6E4}">
+                <adec:decorative xmlns:adec="http://schemas.microsoft.com/office/drawing/2017/decorative" val="1"/>
+              </a:ext>
+            </a:extLst>
+          </p:cNvPr>
+          <p:cNvSpPr>
+            <a:spLocks noGrp="1" noRot="1" noChangeAspect="1" noMove="1" noResize="1" noEditPoints="1" noAdjustHandles="1" noChangeArrowheads="1" noChangeShapeType="1" noTextEdit="1"/>
+          </p:cNvSpPr>
+          <p:nvPr>
+            <p:extLst>
+              <p:ext uri="{386F3935-93C4-4BCD-93E2-E3B085C9AB24}">
+                <p16:designElem xmlns:p16="http://schemas.microsoft.com/office/powerpoint/2015/main" val="1"/>
+              </p:ext>
+            </p:extLst>
+          </p:nvPr>
+        </p:nvSpPr>
+        <p:spPr>
+          <a:xfrm>
+            <a:off x="1" y="6400800"/>
+            <a:ext cx="12192000" cy="457200"/>
+          </a:xfrm>
+          <a:prstGeom prst="rect">
+            <a:avLst/>
+          </a:prstGeom>
+          <a:solidFill>
+            <a:schemeClr val="accent2"/>
+          </a:solidFill>
+          <a:ln>
+            <a:noFill/>
+          </a:ln>
+        </p:spPr>
+        <p:style>
+          <a:lnRef idx="2">
+            <a:schemeClr val="accent1">
+              <a:shade val="50000"/>
+            </a:schemeClr>
+          </a:lnRef>
+          <a:fillRef idx="1">
+            <a:schemeClr val="accent1"/>
+          </a:fillRef>
+          <a:effectRef idx="0">
+            <a:schemeClr val="accent1"/>
+          </a:effectRef>
+          <a:fontRef idx="minor">
+            <a:schemeClr val="lt1"/>
+          </a:fontRef>
+        </p:style>
       </p:sp>
     </p:spTree>
     <p:extLst>
       <p:ext uri="{BB962C8B-B14F-4D97-AF65-F5344CB8AC3E}">
-        <p14:creationId xmlns:p14="http://schemas.microsoft.com/office/powerpoint/2010/main" val="264482599"/>
+        <p14:creationId xmlns:p14="http://schemas.microsoft.com/office/powerpoint/2010/main" val="1521376530"/>
       </p:ext>
     </p:extLst>
   </p:cSld>
@@ -4682,14 +4819,6 @@
 <file path=ppt/slides/slide5.xml><?xml version="1.0" encoding="utf-8"?>
 <p:sld xmlns:a="http://schemas.openxmlformats.org/drawingml/2006/main" xmlns:r="http://schemas.openxmlformats.org/officeDocument/2006/relationships" xmlns:p="http://schemas.openxmlformats.org/presentationml/2006/main">
   <p:cSld>
-    <p:bg>
-      <p:bgPr>
-        <a:solidFill>
-          <a:schemeClr val="bg1"/>
-        </a:solidFill>
-        <a:effectLst/>
-      </p:bgPr>
-    </p:bg>
     <p:spTree>
       <p:nvGrpSpPr>
         <p:cNvPr id="1" name=""/>
@@ -4704,72 +4833,40 @@
           <a:chExt cx="0" cy="0"/>
         </a:xfrm>
       </p:grpSpPr>
-      <p:sp useBgFill="1">
-        <p:nvSpPr>
-          <p:cNvPr id="71" name="Rectangle 70">
+      <p:sp>
+        <p:nvSpPr>
+          <p:cNvPr id="2" name="Title 1">
             <a:extLst>
               <a:ext uri="{FF2B5EF4-FFF2-40B4-BE49-F238E27FC236}">
-                <a16:creationId xmlns:a16="http://schemas.microsoft.com/office/drawing/2014/main" id="{52ABB703-2B0E-4C3B-B4A2-F3973548E561}"/>
-              </a:ext>
-              <a:ext uri="{C183D7F6-B498-43B3-948B-1728B52AA6E4}">
-                <adec:decorative xmlns:adec="http://schemas.microsoft.com/office/drawing/2017/decorative" val="1"/>
+                <a16:creationId xmlns:a16="http://schemas.microsoft.com/office/drawing/2014/main" id="{C17ECC18-6FAF-43FF-A499-D5E79827BCE0}"/>
               </a:ext>
             </a:extLst>
           </p:cNvPr>
           <p:cNvSpPr>
-            <a:spLocks noGrp="1" noRot="1" noChangeAspect="1" noMove="1" noResize="1" noEditPoints="1" noAdjustHandles="1" noChangeArrowheads="1" noChangeShapeType="1" noTextEdit="1"/>
-          </p:cNvSpPr>
-          <p:nvPr>
-            <p:extLst>
-              <p:ext uri="{386F3935-93C4-4BCD-93E2-E3B085C9AB24}">
-                <p16:designElem xmlns:p16="http://schemas.microsoft.com/office/powerpoint/2015/main" val="1"/>
-              </p:ext>
-            </p:extLst>
-          </p:nvPr>
-        </p:nvSpPr>
-        <p:spPr>
-          <a:xfrm>
-            <a:off x="0" y="0"/>
-            <a:ext cx="12192001" cy="6334316"/>
-          </a:xfrm>
-          <a:prstGeom prst="rect">
-            <a:avLst/>
-          </a:prstGeom>
-          <a:ln>
-            <a:noFill/>
-          </a:ln>
-        </p:spPr>
-        <p:style>
-          <a:lnRef idx="2">
-            <a:schemeClr val="accent1">
-              <a:shade val="50000"/>
-            </a:schemeClr>
-          </a:lnRef>
-          <a:fillRef idx="1">
-            <a:schemeClr val="accent1"/>
-          </a:fillRef>
-          <a:effectRef idx="0">
-            <a:schemeClr val="accent1"/>
-          </a:effectRef>
-          <a:fontRef idx="minor">
-            <a:schemeClr val="lt1"/>
-          </a:fontRef>
-        </p:style>
-        <p:txBody>
-          <a:bodyPr rtlCol="0" anchor="ctr"/>
-          <a:lstStyle/>
-          <a:p>
-            <a:pPr algn="ctr"/>
-            <a:endParaRPr lang="en-US"/>
-          </a:p>
-        </p:txBody>
-      </p:sp>
-      <p:sp>
-        <p:nvSpPr>
-          <p:cNvPr id="2" name="Title 1">
+            <a:spLocks noGrp="1"/>
+          </p:cNvSpPr>
+          <p:nvPr>
+            <p:ph type="title"/>
+          </p:nvPr>
+        </p:nvSpPr>
+        <p:spPr/>
+        <p:txBody>
+          <a:bodyPr/>
+          <a:lstStyle/>
+          <a:p>
+            <a:r>
+              <a:rPr lang="en-US" dirty="0"/>
+              <a:t>Distributed Systems</a:t>
+            </a:r>
+          </a:p>
+        </p:txBody>
+      </p:sp>
+      <p:sp>
+        <p:nvSpPr>
+          <p:cNvPr id="3" name="Content Placeholder 2">
             <a:extLst>
               <a:ext uri="{FF2B5EF4-FFF2-40B4-BE49-F238E27FC236}">
-                <a16:creationId xmlns:a16="http://schemas.microsoft.com/office/drawing/2014/main" id="{950162EC-A965-4272-9707-B779D2540886}"/>
+                <a16:creationId xmlns:a16="http://schemas.microsoft.com/office/drawing/2014/main" id="{81DFDCA9-C3C0-4F49-A7F4-318F150DD54B}"/>
               </a:ext>
             </a:extLst>
           </p:cNvPr>
@@ -4777,280 +4874,240 @@
             <a:spLocks noGrp="1"/>
           </p:cNvSpPr>
           <p:nvPr>
-            <p:ph type="title"/>
-          </p:nvPr>
-        </p:nvSpPr>
-        <p:spPr>
-          <a:xfrm>
-            <a:off x="6411685" y="634946"/>
-            <a:ext cx="5127171" cy="1450757"/>
-          </a:xfrm>
-        </p:spPr>
-        <p:txBody>
-          <a:bodyPr>
-            <a:normAutofit/>
+            <p:ph idx="1"/>
+          </p:nvPr>
+        </p:nvSpPr>
+        <p:spPr/>
+        <p:txBody>
+          <a:bodyPr vert="horz" lIns="0" tIns="45720" rIns="0" bIns="45720" rtlCol="0" anchor="t">
+            <a:normAutofit lnSpcReduction="10000"/>
           </a:bodyPr>
           <a:lstStyle/>
           <a:p>
-            <a:r>
-              <a:rPr lang="en-US" dirty="0"/>
-              <a:t>Current Architecture</a:t>
-            </a:r>
-          </a:p>
-        </p:txBody>
-      </p:sp>
-      <p:pic>
-        <p:nvPicPr>
-          <p:cNvPr id="1026" name="Picture 2" descr="https://lh5.googleusercontent.com/rSk3S1pd8PhzqhjEBtk5BVNuRMkSmithP_XZyXUDabtCnmGQxIfhSeZEaXFVTw3rBjVViTbO-lw8RGhypPyRRX4Vhdj66_9gonkQgKgZVY58LUjCRRzKuU63KNft7Xdy1QeLs-_kMVU">
-            <a:extLst>
-              <a:ext uri="{FF2B5EF4-FFF2-40B4-BE49-F238E27FC236}">
-                <a16:creationId xmlns:a16="http://schemas.microsoft.com/office/drawing/2014/main" id="{3E35A08D-A0B1-433F-841B-5395E4DDE0C6}"/>
-              </a:ext>
-            </a:extLst>
-          </p:cNvPr>
-          <p:cNvPicPr>
-            <a:picLocks noChangeAspect="1" noChangeArrowheads="1"/>
-          </p:cNvPicPr>
-          <p:nvPr/>
-        </p:nvPicPr>
-        <p:blipFill>
-          <a:blip r:embed="rId2">
-            <a:extLst>
-              <a:ext uri="{28A0092B-C50C-407E-A947-70E740481C1C}">
-                <a14:useLocalDpi xmlns:a14="http://schemas.microsoft.com/office/drawing/2010/main" val="0"/>
-              </a:ext>
-            </a:extLst>
-          </a:blip>
-          <a:srcRect/>
-          <a:stretch>
-            <a:fillRect/>
-          </a:stretch>
-        </p:blipFill>
-        <p:spPr bwMode="auto">
-          <a:xfrm>
-            <a:off x="1925875" y="645106"/>
-            <a:ext cx="2886260" cy="5247747"/>
-          </a:xfrm>
-          <a:prstGeom prst="rect">
-            <a:avLst/>
-          </a:prstGeom>
-          <a:noFill/>
-          <a:extLst>
-            <a:ext uri="{909E8E84-426E-40DD-AFC4-6F175D3DCCD1}">
-              <a14:hiddenFill xmlns:a14="http://schemas.microsoft.com/office/drawing/2010/main">
-                <a:solidFill>
-                  <a:srgbClr val="FFFFFF"/>
-                </a:solidFill>
-              </a14:hiddenFill>
-            </a:ext>
-          </a:extLst>
-        </p:spPr>
-      </p:pic>
-      <p:cxnSp>
-        <p:nvCxnSpPr>
-          <p:cNvPr id="73" name="Straight Connector 72">
-            <a:extLst>
-              <a:ext uri="{FF2B5EF4-FFF2-40B4-BE49-F238E27FC236}">
-                <a16:creationId xmlns:a16="http://schemas.microsoft.com/office/drawing/2014/main" id="{9C21570E-E159-49A6-9891-FA397B7A92D3}"/>
-              </a:ext>
-              <a:ext uri="{C183D7F6-B498-43B3-948B-1728B52AA6E4}">
-                <adec:decorative xmlns:adec="http://schemas.microsoft.com/office/drawing/2017/decorative" val="1"/>
-              </a:ext>
-            </a:extLst>
-          </p:cNvPr>
-          <p:cNvCxnSpPr>
-            <a:cxnSpLocks noGrp="1" noRot="1" noChangeAspect="1" noMove="1" noResize="1" noEditPoints="1" noAdjustHandles="1" noChangeArrowheads="1" noChangeShapeType="1"/>
-          </p:cNvCxnSpPr>
-          <p:nvPr>
-            <p:extLst>
-              <p:ext uri="{386F3935-93C4-4BCD-93E2-E3B085C9AB24}">
-                <p16:designElem xmlns:p16="http://schemas.microsoft.com/office/powerpoint/2015/main" val="1"/>
-              </p:ext>
-            </p:extLst>
-          </p:nvPr>
-        </p:nvCxnSpPr>
-        <p:spPr>
-          <a:xfrm>
-            <a:off x="6411684" y="2086188"/>
-            <a:ext cx="4748808" cy="0"/>
-          </a:xfrm>
-          <a:prstGeom prst="line">
-            <a:avLst/>
-          </a:prstGeom>
-          <a:ln w="6350">
-            <a:solidFill>
-              <a:schemeClr val="tx1">
-                <a:lumMod val="50000"/>
-                <a:lumOff val="50000"/>
-                <a:alpha val="90000"/>
-              </a:schemeClr>
-            </a:solidFill>
-          </a:ln>
-        </p:spPr>
-        <p:style>
-          <a:lnRef idx="1">
-            <a:schemeClr val="accent1"/>
-          </a:lnRef>
-          <a:fillRef idx="0">
-            <a:schemeClr val="accent1"/>
-          </a:fillRef>
-          <a:effectRef idx="0">
-            <a:schemeClr val="accent1"/>
-          </a:effectRef>
-          <a:fontRef idx="minor">
-            <a:schemeClr val="tx1"/>
-          </a:fontRef>
-        </p:style>
-      </p:cxnSp>
-      <p:sp>
-        <p:nvSpPr>
-          <p:cNvPr id="3" name="Content Placeholder 2">
-            <a:extLst>
-              <a:ext uri="{FF2B5EF4-FFF2-40B4-BE49-F238E27FC236}">
-                <a16:creationId xmlns:a16="http://schemas.microsoft.com/office/drawing/2014/main" id="{404C6011-ECB3-41FD-89EB-6E52841D6A1E}"/>
-              </a:ext>
-            </a:extLst>
-          </p:cNvPr>
-          <p:cNvSpPr>
-            <a:spLocks noGrp="1"/>
-          </p:cNvSpPr>
-          <p:nvPr>
-            <p:ph idx="1"/>
-          </p:nvPr>
-        </p:nvSpPr>
-        <p:spPr>
-          <a:xfrm>
-            <a:off x="6411684" y="2198914"/>
-            <a:ext cx="5127172" cy="3670180"/>
-          </a:xfrm>
-        </p:spPr>
-        <p:txBody>
-          <a:bodyPr>
-            <a:normAutofit/>
-          </a:bodyPr>
-          <a:lstStyle/>
-          <a:p>
-            <a:r>
-              <a:rPr lang="en-US" dirty="0"/>
-              <a:t>Database is doing too many things</a:t>
-            </a:r>
-          </a:p>
-        </p:txBody>
-      </p:sp>
-      <p:sp>
-        <p:nvSpPr>
-          <p:cNvPr id="75" name="Rectangle 74">
-            <a:extLst>
-              <a:ext uri="{FF2B5EF4-FFF2-40B4-BE49-F238E27FC236}">
-                <a16:creationId xmlns:a16="http://schemas.microsoft.com/office/drawing/2014/main" id="{E95DA498-D9A2-4DA9-B9DA-B3776E08CF7E}"/>
-              </a:ext>
-              <a:ext uri="{C183D7F6-B498-43B3-948B-1728B52AA6E4}">
-                <adec:decorative xmlns:adec="http://schemas.microsoft.com/office/drawing/2017/decorative" val="1"/>
-              </a:ext>
-            </a:extLst>
-          </p:cNvPr>
-          <p:cNvSpPr>
-            <a:spLocks noGrp="1" noRot="1" noChangeAspect="1" noMove="1" noResize="1" noEditPoints="1" noAdjustHandles="1" noChangeArrowheads="1" noChangeShapeType="1" noTextEdit="1"/>
-          </p:cNvSpPr>
-          <p:nvPr>
-            <p:extLst>
-              <p:ext uri="{386F3935-93C4-4BCD-93E2-E3B085C9AB24}">
-                <p16:designElem xmlns:p16="http://schemas.microsoft.com/office/powerpoint/2015/main" val="1"/>
-              </p:ext>
-            </p:extLst>
-          </p:nvPr>
-        </p:nvSpPr>
-        <p:spPr>
-          <a:xfrm>
-            <a:off x="15" y="6334316"/>
-            <a:ext cx="12191985" cy="66484"/>
-          </a:xfrm>
-          <a:prstGeom prst="rect">
-            <a:avLst/>
-          </a:prstGeom>
-          <a:solidFill>
-            <a:schemeClr val="accent1"/>
-          </a:solidFill>
-          <a:ln>
-            <a:noFill/>
-          </a:ln>
-        </p:spPr>
-        <p:style>
-          <a:lnRef idx="2">
-            <a:schemeClr val="accent1">
-              <a:shade val="50000"/>
-            </a:schemeClr>
-          </a:lnRef>
-          <a:fillRef idx="1">
-            <a:schemeClr val="accent1"/>
-          </a:fillRef>
-          <a:effectRef idx="0">
-            <a:schemeClr val="accent1"/>
-          </a:effectRef>
-          <a:fontRef idx="minor">
-            <a:schemeClr val="lt1"/>
-          </a:fontRef>
-        </p:style>
-      </p:sp>
-      <p:sp>
-        <p:nvSpPr>
-          <p:cNvPr id="77" name="Rectangle 76">
-            <a:extLst>
-              <a:ext uri="{FF2B5EF4-FFF2-40B4-BE49-F238E27FC236}">
-                <a16:creationId xmlns:a16="http://schemas.microsoft.com/office/drawing/2014/main" id="{82A73093-4B9D-420D-B17E-52293703A1D4}"/>
-              </a:ext>
-              <a:ext uri="{C183D7F6-B498-43B3-948B-1728B52AA6E4}">
-                <adec:decorative xmlns:adec="http://schemas.microsoft.com/office/drawing/2017/decorative" val="1"/>
-              </a:ext>
-            </a:extLst>
-          </p:cNvPr>
-          <p:cNvSpPr>
-            <a:spLocks noGrp="1" noRot="1" noChangeAspect="1" noMove="1" noResize="1" noEditPoints="1" noAdjustHandles="1" noChangeArrowheads="1" noChangeShapeType="1" noTextEdit="1"/>
-          </p:cNvSpPr>
-          <p:nvPr>
-            <p:extLst>
-              <p:ext uri="{386F3935-93C4-4BCD-93E2-E3B085C9AB24}">
-                <p16:designElem xmlns:p16="http://schemas.microsoft.com/office/powerpoint/2015/main" val="1"/>
-              </p:ext>
-            </p:extLst>
-          </p:nvPr>
-        </p:nvSpPr>
-        <p:spPr>
-          <a:xfrm>
-            <a:off x="1" y="6400800"/>
-            <a:ext cx="12192000" cy="457200"/>
-          </a:xfrm>
-          <a:prstGeom prst="rect">
-            <a:avLst/>
-          </a:prstGeom>
-          <a:solidFill>
-            <a:schemeClr val="accent2"/>
-          </a:solidFill>
-          <a:ln>
-            <a:noFill/>
-          </a:ln>
-        </p:spPr>
-        <p:style>
-          <a:lnRef idx="2">
-            <a:schemeClr val="accent1">
-              <a:shade val="50000"/>
-            </a:schemeClr>
-          </a:lnRef>
-          <a:fillRef idx="1">
-            <a:schemeClr val="accent1"/>
-          </a:fillRef>
-          <a:effectRef idx="0">
-            <a:schemeClr val="accent1"/>
-          </a:effectRef>
-          <a:fontRef idx="minor">
-            <a:schemeClr val="lt1"/>
-          </a:fontRef>
-        </p:style>
+            <a:pPr>
+              <a:buFont typeface="Arial" panose="020F0502020204030204" pitchFamily="34" charset="0"/>
+              <a:buChar char="•"/>
+            </a:pPr>
+            <a:r>
+              <a:rPr lang="en-US" dirty="0">
+                <a:cs typeface="Calibri"/>
+              </a:rPr>
+              <a:t>A series of network coordinated servers/nodes that can share request load</a:t>
+            </a:r>
+          </a:p>
+          <a:p>
+            <a:pPr marL="383540" lvl="1">
+              <a:buFont typeface="Arial" panose="020F0502020204030204" pitchFamily="34" charset="0"/>
+              <a:buChar char="•"/>
+            </a:pPr>
+            <a:r>
+              <a:rPr lang="en-US" dirty="0">
+                <a:cs typeface="Calibri"/>
+              </a:rPr>
+              <a:t>Can scale on demand ("Horizontal Scaling / Scale Out")</a:t>
+            </a:r>
+            <a:endParaRPr lang="en-US" dirty="0"/>
+          </a:p>
+          <a:p>
+            <a:pPr>
+              <a:buFont typeface="Arial,Sans-Serif" panose="020F0502020204030204" pitchFamily="34" charset="0"/>
+              <a:buChar char="•"/>
+            </a:pPr>
+            <a:r>
+              <a:rPr lang="en-US" dirty="0">
+                <a:cs typeface="Calibri"/>
+              </a:rPr>
+              <a:t>Reads separated from writes</a:t>
+            </a:r>
+          </a:p>
+          <a:p>
+            <a:pPr marL="383540" lvl="1">
+              <a:buFont typeface="Arial,Sans-Serif" panose="020F0502020204030204" pitchFamily="34" charset="0"/>
+              <a:buChar char="•"/>
+            </a:pPr>
+            <a:r>
+              <a:rPr lang="en-US" dirty="0">
+                <a:cs typeface="Calibri"/>
+              </a:rPr>
+              <a:t>Data is consistent within version of database</a:t>
+            </a:r>
+          </a:p>
+          <a:p>
+            <a:pPr marL="383540" lvl="1">
+              <a:buFont typeface="Arial,Sans-Serif" panose="020F0502020204030204" pitchFamily="34" charset="0"/>
+              <a:buChar char="•"/>
+            </a:pPr>
+            <a:r>
+              <a:rPr lang="en-US" dirty="0">
+                <a:cs typeface="Calibri"/>
+              </a:rPr>
+              <a:t>Timestamped transactions</a:t>
+            </a:r>
+          </a:p>
+          <a:p>
+            <a:pPr>
+              <a:buFont typeface="Arial,Sans-Serif" panose="020F0502020204030204" pitchFamily="34" charset="0"/>
+              <a:buChar char="•"/>
+            </a:pPr>
+            <a:r>
+              <a:rPr lang="en-US" dirty="0">
+                <a:cs typeface="Calibri"/>
+              </a:rPr>
+              <a:t>Single </a:t>
+            </a:r>
+            <a:r>
+              <a:rPr lang="en-US" dirty="0" err="1">
+                <a:cs typeface="Calibri"/>
+              </a:rPr>
+              <a:t>Transactor</a:t>
+            </a:r>
+            <a:r>
+              <a:rPr lang="en-US" dirty="0">
+                <a:cs typeface="Calibri"/>
+              </a:rPr>
+              <a:t> for writes</a:t>
+            </a:r>
+          </a:p>
+          <a:p>
+            <a:pPr>
+              <a:buFont typeface="Arial,Sans-Serif" panose="020F0502020204030204" pitchFamily="34" charset="0"/>
+              <a:buChar char="•"/>
+            </a:pPr>
+            <a:r>
+              <a:rPr lang="en-US" dirty="0">
+                <a:cs typeface="Calibri"/>
+              </a:rPr>
+              <a:t>Peers made aware of newer versions of </a:t>
+            </a:r>
+            <a:r>
+              <a:rPr lang="en-US" dirty="0" err="1">
+                <a:cs typeface="Calibri"/>
+              </a:rPr>
+              <a:t>db</a:t>
+            </a:r>
+            <a:r>
+              <a:rPr lang="en-US" dirty="0">
+                <a:cs typeface="Calibri"/>
+              </a:rPr>
+              <a:t> as writes occur</a:t>
+            </a:r>
+          </a:p>
+          <a:p>
+            <a:pPr marL="383540" lvl="1">
+              <a:buFont typeface="Arial,Sans-Serif" panose="020F0502020204030204" pitchFamily="34" charset="0"/>
+              <a:buChar char="•"/>
+            </a:pPr>
+            <a:r>
+              <a:rPr lang="en-US" dirty="0">
+                <a:cs typeface="Calibri"/>
+              </a:rPr>
+              <a:t>Free to query latest or a specific version</a:t>
+            </a:r>
+            <a:endParaRPr lang="en-US" dirty="0"/>
+          </a:p>
+          <a:p>
+            <a:pPr>
+              <a:buFont typeface="Arial" panose="020F0502020204030204" pitchFamily="34" charset="0"/>
+              <a:buChar char="•"/>
+            </a:pPr>
+            <a:r>
+              <a:rPr lang="en-US" dirty="0">
+                <a:cs typeface="Calibri"/>
+              </a:rPr>
+              <a:t>Caches "warmed" to calls from region</a:t>
+            </a:r>
+            <a:endParaRPr lang="en-US" dirty="0"/>
+          </a:p>
+          <a:p>
+            <a:pPr marL="383540" lvl="1">
+              <a:buFont typeface="Arial" panose="020F0502020204030204" pitchFamily="34" charset="0"/>
+              <a:buChar char="•"/>
+            </a:pPr>
+            <a:r>
+              <a:rPr lang="en-US" dirty="0">
+                <a:cs typeface="Calibri"/>
+              </a:rPr>
+              <a:t>No need to hit storage if you have local copy of </a:t>
+            </a:r>
+            <a:r>
+              <a:rPr lang="en-US" dirty="0" err="1">
+                <a:cs typeface="Calibri"/>
+              </a:rPr>
+              <a:t>db</a:t>
+            </a:r>
+          </a:p>
+          <a:p>
+            <a:pPr marL="383540" lvl="1">
+              <a:buFont typeface="Arial" panose="020F0502020204030204" pitchFamily="34" charset="0"/>
+              <a:buChar char="•"/>
+            </a:pPr>
+            <a:r>
+              <a:rPr lang="en-US" dirty="0">
+                <a:cs typeface="Calibri"/>
+              </a:rPr>
+              <a:t>Peers can be specialized for certain roles (Catalog / Analytics) </a:t>
+            </a:r>
+          </a:p>
+          <a:p>
+            <a:pPr>
+              <a:buFont typeface="Arial" panose="020F0502020204030204" pitchFamily="34" charset="0"/>
+              <a:buChar char="•"/>
+            </a:pPr>
+            <a:endParaRPr lang="en-US" dirty="0">
+              <a:cs typeface="Calibri"/>
+            </a:endParaRPr>
+          </a:p>
+          <a:p>
+            <a:pPr>
+              <a:buFont typeface="Arial" panose="020F0502020204030204" pitchFamily="34" charset="0"/>
+              <a:buChar char="•"/>
+            </a:pPr>
+            <a:endParaRPr lang="en-US" dirty="0">
+              <a:cs typeface="Calibri"/>
+            </a:endParaRPr>
+          </a:p>
+          <a:p>
+            <a:pPr>
+              <a:buFont typeface="Arial" panose="020F0502020204030204" pitchFamily="34" charset="0"/>
+              <a:buChar char="•"/>
+            </a:pPr>
+            <a:endParaRPr lang="en-US" dirty="0">
+              <a:cs typeface="Calibri"/>
+            </a:endParaRPr>
+          </a:p>
+          <a:p>
+            <a:pPr marL="383540" lvl="1">
+              <a:buFont typeface="Arial" panose="020F0502020204030204" pitchFamily="34" charset="0"/>
+              <a:buChar char="•"/>
+            </a:pPr>
+            <a:endParaRPr lang="en-US" dirty="0">
+              <a:cs typeface="Calibri"/>
+            </a:endParaRPr>
+          </a:p>
+          <a:p>
+            <a:pPr marL="383540" lvl="1">
+              <a:buFont typeface="Arial" panose="020F0502020204030204" pitchFamily="34" charset="0"/>
+              <a:buChar char="•"/>
+            </a:pPr>
+            <a:endParaRPr lang="en-US" dirty="0">
+              <a:cs typeface="Calibri"/>
+            </a:endParaRPr>
+          </a:p>
+          <a:p>
+            <a:pPr>
+              <a:buFont typeface="Arial" panose="020F0502020204030204" pitchFamily="34" charset="0"/>
+              <a:buChar char="•"/>
+            </a:pPr>
+            <a:endParaRPr lang="en-US" dirty="0">
+              <a:cs typeface="Calibri"/>
+            </a:endParaRPr>
+          </a:p>
+        </p:txBody>
       </p:sp>
     </p:spTree>
     <p:extLst>
       <p:ext uri="{BB962C8B-B14F-4D97-AF65-F5344CB8AC3E}">
-        <p14:creationId xmlns:p14="http://schemas.microsoft.com/office/powerpoint/2010/main" val="1521376530"/>
+        <p14:creationId xmlns:p14="http://schemas.microsoft.com/office/powerpoint/2010/main" val="264482599"/>
       </p:ext>
     </p:extLst>
   </p:cSld>

</xml_diff>

<commit_message>
One more slide change
</commit_message>
<xml_diff>
--- a/rosp.pptx
+++ b/rosp.pptx
@@ -121,7 +121,7 @@
 <file path=ppt/revisionInfo.xml><?xml version="1.0" encoding="utf-8"?>
 <p1510:revInfo xmlns:a="http://schemas.openxmlformats.org/drawingml/2006/main" xmlns:r="http://schemas.openxmlformats.org/officeDocument/2006/relationships" xmlns:p1510="http://schemas.microsoft.com/office/powerpoint/2015/10/main">
   <p1510:revLst>
-    <p1510:client id="{F6A590FC-77AD-4D64-A055-2FB8CEB1E6D6}" v="3" dt="2019-03-05T15:11:23.274"/>
+    <p1510:client id="{F6A590FC-77AD-4D64-A055-2FB8CEB1E6D6}" v="14" dt="2019-03-05T15:23:26.885"/>
   </p1510:revLst>
 </p1510:revInfo>
 </file>
@@ -131,10 +131,25 @@
   <pc:docChgLst>
     <pc:chgData name="Tyler Morten" userId="0c572a89dece06f5" providerId="LiveId" clId="{F6A590FC-77AD-4D64-A055-2FB8CEB1E6D6}"/>
     <pc:docChg chg="custSel modSld sldOrd">
-      <pc:chgData name="Tyler Morten" userId="0c572a89dece06f5" providerId="LiveId" clId="{F6A590FC-77AD-4D64-A055-2FB8CEB1E6D6}" dt="2019-03-05T15:11:35.056" v="81" actId="313"/>
+      <pc:chgData name="Tyler Morten" userId="0c572a89dece06f5" providerId="LiveId" clId="{F6A590FC-77AD-4D64-A055-2FB8CEB1E6D6}" dt="2019-03-05T15:23:26.885" v="163"/>
       <pc:docMkLst>
         <pc:docMk/>
       </pc:docMkLst>
+      <pc:sldChg chg="modSp">
+        <pc:chgData name="Tyler Morten" userId="0c572a89dece06f5" providerId="LiveId" clId="{F6A590FC-77AD-4D64-A055-2FB8CEB1E6D6}" dt="2019-03-05T15:13:09.693" v="95" actId="20577"/>
+        <pc:sldMkLst>
+          <pc:docMk/>
+          <pc:sldMk cId="685448656" sldId="256"/>
+        </pc:sldMkLst>
+        <pc:spChg chg="mod">
+          <ac:chgData name="Tyler Morten" userId="0c572a89dece06f5" providerId="LiveId" clId="{F6A590FC-77AD-4D64-A055-2FB8CEB1E6D6}" dt="2019-03-05T15:13:09.693" v="95" actId="20577"/>
+          <ac:spMkLst>
+            <pc:docMk/>
+            <pc:sldMk cId="685448656" sldId="256"/>
+            <ac:spMk id="3" creationId="{CCAC4D93-3B6C-420C-B907-6C15E43BFF33}"/>
+          </ac:spMkLst>
+        </pc:spChg>
+      </pc:sldChg>
       <pc:sldChg chg="modSp">
         <pc:chgData name="Tyler Morten" userId="0c572a89dece06f5" providerId="LiveId" clId="{F6A590FC-77AD-4D64-A055-2FB8CEB1E6D6}" dt="2019-03-05T15:11:35.056" v="81" actId="313"/>
         <pc:sldMkLst>
@@ -150,12 +165,20 @@
           </ac:spMkLst>
         </pc:spChg>
       </pc:sldChg>
-      <pc:sldChg chg="ord">
-        <pc:chgData name="Tyler Morten" userId="0c572a89dece06f5" providerId="LiveId" clId="{F6A590FC-77AD-4D64-A055-2FB8CEB1E6D6}" dt="2019-03-05T15:10:44.997" v="0"/>
+      <pc:sldChg chg="modSp ord modAnim">
+        <pc:chgData name="Tyler Morten" userId="0c572a89dece06f5" providerId="LiveId" clId="{F6A590FC-77AD-4D64-A055-2FB8CEB1E6D6}" dt="2019-03-05T15:23:26.885" v="163"/>
         <pc:sldMkLst>
           <pc:docMk/>
           <pc:sldMk cId="1259622013" sldId="258"/>
         </pc:sldMkLst>
+        <pc:spChg chg="mod">
+          <ac:chgData name="Tyler Morten" userId="0c572a89dece06f5" providerId="LiveId" clId="{F6A590FC-77AD-4D64-A055-2FB8CEB1E6D6}" dt="2019-03-05T15:22:22.560" v="152" actId="12"/>
+          <ac:spMkLst>
+            <pc:docMk/>
+            <pc:sldMk cId="1259622013" sldId="258"/>
+            <ac:spMk id="3" creationId="{049BB99D-206E-4717-A709-1F48443014E3}"/>
+          </ac:spMkLst>
+        </pc:spChg>
       </pc:sldChg>
       <pc:sldChg chg="ord">
         <pc:chgData name="Tyler Morten" userId="0c572a89dece06f5" providerId="LiveId" clId="{F6A590FC-77AD-4D64-A055-2FB8CEB1E6D6}" dt="2019-03-05T15:11:23.272" v="59"/>
@@ -3917,7 +3940,7 @@
           <a:p>
             <a:r>
               <a:rPr lang="en-US" dirty="0"/>
-              <a:t>Software Architecture meetup</a:t>
+              <a:t>Lincoln Software Architecture meetup</a:t>
             </a:r>
           </a:p>
         </p:txBody>
@@ -4668,27 +4691,53 @@
           </a:bodyPr>
           <a:lstStyle/>
           <a:p>
+            <a:pPr>
+              <a:buFont typeface="Arial" panose="020B0604020202020204" pitchFamily="34" charset="0"/>
+              <a:buChar char="•"/>
+            </a:pPr>
             <a:r>
               <a:rPr lang="en-US" dirty="0"/>
               <a:t>Do things really change?</a:t>
             </a:r>
           </a:p>
           <a:p>
+            <a:pPr>
+              <a:buFont typeface="Arial" panose="020B0604020202020204" pitchFamily="34" charset="0"/>
+              <a:buChar char="•"/>
+            </a:pPr>
             <a:r>
               <a:rPr lang="en-US" dirty="0"/>
               <a:t>Or are changes additional information (facts) that happen over a sequence of time?</a:t>
             </a:r>
           </a:p>
           <a:p>
+            <a:pPr>
+              <a:buFont typeface="Arial" panose="020B0604020202020204" pitchFamily="34" charset="0"/>
+              <a:buChar char="•"/>
+            </a:pPr>
             <a:r>
               <a:rPr lang="en-US" dirty="0"/>
-              <a:t>- UPDATE in place is BAD</a:t>
-            </a:r>
-          </a:p>
-          <a:p>
+              <a:t>FACTS never change. They are immutable.</a:t>
+            </a:r>
+          </a:p>
+          <a:p>
+            <a:pPr>
+              <a:buFont typeface="Arial" panose="020B0604020202020204" pitchFamily="34" charset="0"/>
+              <a:buChar char="•"/>
+            </a:pPr>
             <a:r>
               <a:rPr lang="en-US" dirty="0"/>
-              <a:t>- Forces the database to take on too much responsibility </a:t>
+              <a:t>UPDATE in place is BAD.</a:t>
+            </a:r>
+          </a:p>
+          <a:p>
+            <a:pPr>
+              <a:buFont typeface="Arial" panose="020B0604020202020204" pitchFamily="34" charset="0"/>
+              <a:buChar char="•"/>
+            </a:pPr>
+            <a:r>
+              <a:rPr lang="en-US" dirty="0"/>
+              <a:t>Forces the database to take on too much responsibility. </a:t>
             </a:r>
           </a:p>
         </p:txBody>
@@ -4813,6 +4862,1918 @@
   <p:clrMapOvr>
     <a:masterClrMapping/>
   </p:clrMapOvr>
+  <p:timing>
+    <p:tnLst>
+      <p:par>
+        <p:cTn id="1" dur="indefinite" restart="never" nodeType="tmRoot">
+          <p:childTnLst>
+            <p:seq concurrent="1" nextAc="seek">
+              <p:cTn id="2" dur="indefinite" nodeType="mainSeq">
+                <p:childTnLst>
+                  <p:par>
+                    <p:cTn id="3" fill="hold">
+                      <p:stCondLst>
+                        <p:cond delay="indefinite"/>
+                      </p:stCondLst>
+                      <p:childTnLst>
+                        <p:par>
+                          <p:cTn id="4" fill="hold">
+                            <p:stCondLst>
+                              <p:cond delay="0"/>
+                            </p:stCondLst>
+                            <p:childTnLst>
+                              <p:par>
+                                <p:cTn id="5" presetID="42" presetClass="entr" presetSubtype="0" fill="hold" nodeType="clickEffect">
+                                  <p:stCondLst>
+                                    <p:cond delay="0"/>
+                                  </p:stCondLst>
+                                  <p:childTnLst>
+                                    <p:set>
+                                      <p:cBhvr>
+                                        <p:cTn id="6" dur="1" fill="hold">
+                                          <p:stCondLst>
+                                            <p:cond delay="0"/>
+                                          </p:stCondLst>
+                                        </p:cTn>
+                                        <p:tgtEl>
+                                          <p:spTgt spid="7"/>
+                                        </p:tgtEl>
+                                        <p:attrNameLst>
+                                          <p:attrName>style.visibility</p:attrName>
+                                        </p:attrNameLst>
+                                      </p:cBhvr>
+                                      <p:to>
+                                        <p:strVal val="visible"/>
+                                      </p:to>
+                                    </p:set>
+                                    <p:animEffect transition="in" filter="fade">
+                                      <p:cBhvr>
+                                        <p:cTn id="7" dur="1000"/>
+                                        <p:tgtEl>
+                                          <p:spTgt spid="7"/>
+                                        </p:tgtEl>
+                                      </p:cBhvr>
+                                    </p:animEffect>
+                                    <p:anim calcmode="lin" valueType="num">
+                                      <p:cBhvr>
+                                        <p:cTn id="8" dur="1000" fill="hold"/>
+                                        <p:tgtEl>
+                                          <p:spTgt spid="7"/>
+                                        </p:tgtEl>
+                                        <p:attrNameLst>
+                                          <p:attrName>ppt_x</p:attrName>
+                                        </p:attrNameLst>
+                                      </p:cBhvr>
+                                      <p:tavLst>
+                                        <p:tav tm="0">
+                                          <p:val>
+                                            <p:strVal val="#ppt_x"/>
+                                          </p:val>
+                                        </p:tav>
+                                        <p:tav tm="100000">
+                                          <p:val>
+                                            <p:strVal val="#ppt_x"/>
+                                          </p:val>
+                                        </p:tav>
+                                      </p:tavLst>
+                                    </p:anim>
+                                    <p:anim calcmode="lin" valueType="num">
+                                      <p:cBhvr>
+                                        <p:cTn id="9" dur="1000" fill="hold"/>
+                                        <p:tgtEl>
+                                          <p:spTgt spid="7"/>
+                                        </p:tgtEl>
+                                        <p:attrNameLst>
+                                          <p:attrName>ppt_y</p:attrName>
+                                        </p:attrNameLst>
+                                      </p:cBhvr>
+                                      <p:tavLst>
+                                        <p:tav tm="0">
+                                          <p:val>
+                                            <p:strVal val="#ppt_y+.1"/>
+                                          </p:val>
+                                        </p:tav>
+                                        <p:tav tm="100000">
+                                          <p:val>
+                                            <p:strVal val="#ppt_y"/>
+                                          </p:val>
+                                        </p:tav>
+                                      </p:tavLst>
+                                    </p:anim>
+                                  </p:childTnLst>
+                                </p:cTn>
+                              </p:par>
+                            </p:childTnLst>
+                          </p:cTn>
+                        </p:par>
+                      </p:childTnLst>
+                    </p:cTn>
+                  </p:par>
+                  <p:par>
+                    <p:cTn id="10" fill="hold">
+                      <p:stCondLst>
+                        <p:cond delay="indefinite"/>
+                      </p:stCondLst>
+                      <p:childTnLst>
+                        <p:par>
+                          <p:cTn id="11" fill="hold">
+                            <p:stCondLst>
+                              <p:cond delay="0"/>
+                            </p:stCondLst>
+                            <p:childTnLst>
+                              <p:par>
+                                <p:cTn id="12" presetID="26" presetClass="entr" presetSubtype="0" fill="hold" grpId="0" nodeType="clickEffect">
+                                  <p:stCondLst>
+                                    <p:cond delay="0"/>
+                                  </p:stCondLst>
+                                  <p:childTnLst>
+                                    <p:set>
+                                      <p:cBhvr>
+                                        <p:cTn id="13" dur="1" fill="hold">
+                                          <p:stCondLst>
+                                            <p:cond delay="0"/>
+                                          </p:stCondLst>
+                                        </p:cTn>
+                                        <p:tgtEl>
+                                          <p:spTgt spid="3">
+                                            <p:txEl>
+                                              <p:pRg st="0" end="0"/>
+                                            </p:txEl>
+                                          </p:spTgt>
+                                        </p:tgtEl>
+                                        <p:attrNameLst>
+                                          <p:attrName>style.visibility</p:attrName>
+                                        </p:attrNameLst>
+                                      </p:cBhvr>
+                                      <p:to>
+                                        <p:strVal val="visible"/>
+                                      </p:to>
+                                    </p:set>
+                                    <p:animEffect transition="in" filter="wipe(down)">
+                                      <p:cBhvr>
+                                        <p:cTn id="14" dur="580">
+                                          <p:stCondLst>
+                                            <p:cond delay="0"/>
+                                          </p:stCondLst>
+                                        </p:cTn>
+                                        <p:tgtEl>
+                                          <p:spTgt spid="3">
+                                            <p:txEl>
+                                              <p:pRg st="0" end="0"/>
+                                            </p:txEl>
+                                          </p:spTgt>
+                                        </p:tgtEl>
+                                      </p:cBhvr>
+                                    </p:animEffect>
+                                    <p:anim calcmode="lin" valueType="num">
+                                      <p:cBhvr>
+                                        <p:cTn id="15" dur="1822" tmFilter="0,0; 0.14,0.36; 0.43,0.73; 0.71,0.91; 1.0,1.0">
+                                          <p:stCondLst>
+                                            <p:cond delay="0"/>
+                                          </p:stCondLst>
+                                        </p:cTn>
+                                        <p:tgtEl>
+                                          <p:spTgt spid="3">
+                                            <p:txEl>
+                                              <p:pRg st="0" end="0"/>
+                                            </p:txEl>
+                                          </p:spTgt>
+                                        </p:tgtEl>
+                                        <p:attrNameLst>
+                                          <p:attrName>ppt_x</p:attrName>
+                                        </p:attrNameLst>
+                                      </p:cBhvr>
+                                      <p:tavLst>
+                                        <p:tav tm="0">
+                                          <p:val>
+                                            <p:strVal val="#ppt_x-0.25"/>
+                                          </p:val>
+                                        </p:tav>
+                                        <p:tav tm="100000">
+                                          <p:val>
+                                            <p:strVal val="#ppt_x"/>
+                                          </p:val>
+                                        </p:tav>
+                                      </p:tavLst>
+                                    </p:anim>
+                                    <p:anim calcmode="lin" valueType="num">
+                                      <p:cBhvr>
+                                        <p:cTn id="16" dur="664" tmFilter="0.0,0.0; 0.25,0.07; 0.50,0.2; 0.75,0.467; 1.0,1.0">
+                                          <p:stCondLst>
+                                            <p:cond delay="0"/>
+                                          </p:stCondLst>
+                                        </p:cTn>
+                                        <p:tgtEl>
+                                          <p:spTgt spid="3">
+                                            <p:txEl>
+                                              <p:pRg st="0" end="0"/>
+                                            </p:txEl>
+                                          </p:spTgt>
+                                        </p:tgtEl>
+                                        <p:attrNameLst>
+                                          <p:attrName>ppt_y</p:attrName>
+                                        </p:attrNameLst>
+                                      </p:cBhvr>
+                                      <p:tavLst>
+                                        <p:tav tm="0" fmla="#ppt_y-sin(pi*$)/3">
+                                          <p:val>
+                                            <p:fltVal val="0.5"/>
+                                          </p:val>
+                                        </p:tav>
+                                        <p:tav tm="100000">
+                                          <p:val>
+                                            <p:fltVal val="1"/>
+                                          </p:val>
+                                        </p:tav>
+                                      </p:tavLst>
+                                    </p:anim>
+                                    <p:anim calcmode="lin" valueType="num">
+                                      <p:cBhvr>
+                                        <p:cTn id="17" dur="664" tmFilter="0, 0; 0.125,0.2665; 0.25,0.4; 0.375,0.465; 0.5,0.5;  0.625,0.535; 0.75,0.6; 0.875,0.7335; 1,1">
+                                          <p:stCondLst>
+                                            <p:cond delay="664"/>
+                                          </p:stCondLst>
+                                        </p:cTn>
+                                        <p:tgtEl>
+                                          <p:spTgt spid="3">
+                                            <p:txEl>
+                                              <p:pRg st="0" end="0"/>
+                                            </p:txEl>
+                                          </p:spTgt>
+                                        </p:tgtEl>
+                                        <p:attrNameLst>
+                                          <p:attrName>ppt_y</p:attrName>
+                                        </p:attrNameLst>
+                                      </p:cBhvr>
+                                      <p:tavLst>
+                                        <p:tav tm="0" fmla="#ppt_y-sin(pi*$)/9">
+                                          <p:val>
+                                            <p:fltVal val="0"/>
+                                          </p:val>
+                                        </p:tav>
+                                        <p:tav tm="100000">
+                                          <p:val>
+                                            <p:fltVal val="1"/>
+                                          </p:val>
+                                        </p:tav>
+                                      </p:tavLst>
+                                    </p:anim>
+                                    <p:anim calcmode="lin" valueType="num">
+                                      <p:cBhvr>
+                                        <p:cTn id="18" dur="332" tmFilter="0, 0; 0.125,0.2665; 0.25,0.4; 0.375,0.465; 0.5,0.5;  0.625,0.535; 0.75,0.6; 0.875,0.7335; 1,1">
+                                          <p:stCondLst>
+                                            <p:cond delay="1324"/>
+                                          </p:stCondLst>
+                                        </p:cTn>
+                                        <p:tgtEl>
+                                          <p:spTgt spid="3">
+                                            <p:txEl>
+                                              <p:pRg st="0" end="0"/>
+                                            </p:txEl>
+                                          </p:spTgt>
+                                        </p:tgtEl>
+                                        <p:attrNameLst>
+                                          <p:attrName>ppt_y</p:attrName>
+                                        </p:attrNameLst>
+                                      </p:cBhvr>
+                                      <p:tavLst>
+                                        <p:tav tm="0" fmla="#ppt_y-sin(pi*$)/27">
+                                          <p:val>
+                                            <p:fltVal val="0"/>
+                                          </p:val>
+                                        </p:tav>
+                                        <p:tav tm="100000">
+                                          <p:val>
+                                            <p:fltVal val="1"/>
+                                          </p:val>
+                                        </p:tav>
+                                      </p:tavLst>
+                                    </p:anim>
+                                    <p:anim calcmode="lin" valueType="num">
+                                      <p:cBhvr>
+                                        <p:cTn id="19" dur="164" tmFilter="0, 0; 0.125,0.2665; 0.25,0.4; 0.375,0.465; 0.5,0.5;  0.625,0.535; 0.75,0.6; 0.875,0.7335; 1,1">
+                                          <p:stCondLst>
+                                            <p:cond delay="1656"/>
+                                          </p:stCondLst>
+                                        </p:cTn>
+                                        <p:tgtEl>
+                                          <p:spTgt spid="3">
+                                            <p:txEl>
+                                              <p:pRg st="0" end="0"/>
+                                            </p:txEl>
+                                          </p:spTgt>
+                                        </p:tgtEl>
+                                        <p:attrNameLst>
+                                          <p:attrName>ppt_y</p:attrName>
+                                        </p:attrNameLst>
+                                      </p:cBhvr>
+                                      <p:tavLst>
+                                        <p:tav tm="0" fmla="#ppt_y-sin(pi*$)/81">
+                                          <p:val>
+                                            <p:fltVal val="0"/>
+                                          </p:val>
+                                        </p:tav>
+                                        <p:tav tm="100000">
+                                          <p:val>
+                                            <p:fltVal val="1"/>
+                                          </p:val>
+                                        </p:tav>
+                                      </p:tavLst>
+                                    </p:anim>
+                                    <p:animScale>
+                                      <p:cBhvr>
+                                        <p:cTn id="20" dur="26">
+                                          <p:stCondLst>
+                                            <p:cond delay="650"/>
+                                          </p:stCondLst>
+                                        </p:cTn>
+                                        <p:tgtEl>
+                                          <p:spTgt spid="3">
+                                            <p:txEl>
+                                              <p:pRg st="0" end="0"/>
+                                            </p:txEl>
+                                          </p:spTgt>
+                                        </p:tgtEl>
+                                      </p:cBhvr>
+                                      <p:to x="100000" y="60000"/>
+                                    </p:animScale>
+                                    <p:animScale>
+                                      <p:cBhvr>
+                                        <p:cTn id="21" dur="166" decel="50000">
+                                          <p:stCondLst>
+                                            <p:cond delay="676"/>
+                                          </p:stCondLst>
+                                        </p:cTn>
+                                        <p:tgtEl>
+                                          <p:spTgt spid="3">
+                                            <p:txEl>
+                                              <p:pRg st="0" end="0"/>
+                                            </p:txEl>
+                                          </p:spTgt>
+                                        </p:tgtEl>
+                                      </p:cBhvr>
+                                      <p:to x="100000" y="100000"/>
+                                    </p:animScale>
+                                    <p:animScale>
+                                      <p:cBhvr>
+                                        <p:cTn id="22" dur="26">
+                                          <p:stCondLst>
+                                            <p:cond delay="1312"/>
+                                          </p:stCondLst>
+                                        </p:cTn>
+                                        <p:tgtEl>
+                                          <p:spTgt spid="3">
+                                            <p:txEl>
+                                              <p:pRg st="0" end="0"/>
+                                            </p:txEl>
+                                          </p:spTgt>
+                                        </p:tgtEl>
+                                      </p:cBhvr>
+                                      <p:to x="100000" y="80000"/>
+                                    </p:animScale>
+                                    <p:animScale>
+                                      <p:cBhvr>
+                                        <p:cTn id="23" dur="166" decel="50000">
+                                          <p:stCondLst>
+                                            <p:cond delay="1338"/>
+                                          </p:stCondLst>
+                                        </p:cTn>
+                                        <p:tgtEl>
+                                          <p:spTgt spid="3">
+                                            <p:txEl>
+                                              <p:pRg st="0" end="0"/>
+                                            </p:txEl>
+                                          </p:spTgt>
+                                        </p:tgtEl>
+                                      </p:cBhvr>
+                                      <p:to x="100000" y="100000"/>
+                                    </p:animScale>
+                                    <p:animScale>
+                                      <p:cBhvr>
+                                        <p:cTn id="24" dur="26">
+                                          <p:stCondLst>
+                                            <p:cond delay="1642"/>
+                                          </p:stCondLst>
+                                        </p:cTn>
+                                        <p:tgtEl>
+                                          <p:spTgt spid="3">
+                                            <p:txEl>
+                                              <p:pRg st="0" end="0"/>
+                                            </p:txEl>
+                                          </p:spTgt>
+                                        </p:tgtEl>
+                                      </p:cBhvr>
+                                      <p:to x="100000" y="90000"/>
+                                    </p:animScale>
+                                    <p:animScale>
+                                      <p:cBhvr>
+                                        <p:cTn id="25" dur="166" decel="50000">
+                                          <p:stCondLst>
+                                            <p:cond delay="1668"/>
+                                          </p:stCondLst>
+                                        </p:cTn>
+                                        <p:tgtEl>
+                                          <p:spTgt spid="3">
+                                            <p:txEl>
+                                              <p:pRg st="0" end="0"/>
+                                            </p:txEl>
+                                          </p:spTgt>
+                                        </p:tgtEl>
+                                      </p:cBhvr>
+                                      <p:to x="100000" y="100000"/>
+                                    </p:animScale>
+                                    <p:animScale>
+                                      <p:cBhvr>
+                                        <p:cTn id="26" dur="26">
+                                          <p:stCondLst>
+                                            <p:cond delay="1808"/>
+                                          </p:stCondLst>
+                                        </p:cTn>
+                                        <p:tgtEl>
+                                          <p:spTgt spid="3">
+                                            <p:txEl>
+                                              <p:pRg st="0" end="0"/>
+                                            </p:txEl>
+                                          </p:spTgt>
+                                        </p:tgtEl>
+                                      </p:cBhvr>
+                                      <p:to x="100000" y="95000"/>
+                                    </p:animScale>
+                                    <p:animScale>
+                                      <p:cBhvr>
+                                        <p:cTn id="27" dur="166" decel="50000">
+                                          <p:stCondLst>
+                                            <p:cond delay="1834"/>
+                                          </p:stCondLst>
+                                        </p:cTn>
+                                        <p:tgtEl>
+                                          <p:spTgt spid="3">
+                                            <p:txEl>
+                                              <p:pRg st="0" end="0"/>
+                                            </p:txEl>
+                                          </p:spTgt>
+                                        </p:tgtEl>
+                                      </p:cBhvr>
+                                      <p:to x="100000" y="100000"/>
+                                    </p:animScale>
+                                  </p:childTnLst>
+                                </p:cTn>
+                              </p:par>
+                            </p:childTnLst>
+                          </p:cTn>
+                        </p:par>
+                      </p:childTnLst>
+                    </p:cTn>
+                  </p:par>
+                  <p:par>
+                    <p:cTn id="28" fill="hold">
+                      <p:stCondLst>
+                        <p:cond delay="indefinite"/>
+                      </p:stCondLst>
+                      <p:childTnLst>
+                        <p:par>
+                          <p:cTn id="29" fill="hold">
+                            <p:stCondLst>
+                              <p:cond delay="0"/>
+                            </p:stCondLst>
+                            <p:childTnLst>
+                              <p:par>
+                                <p:cTn id="30" presetID="26" presetClass="entr" presetSubtype="0" fill="hold" grpId="0" nodeType="clickEffect">
+                                  <p:stCondLst>
+                                    <p:cond delay="0"/>
+                                  </p:stCondLst>
+                                  <p:childTnLst>
+                                    <p:set>
+                                      <p:cBhvr>
+                                        <p:cTn id="31" dur="1" fill="hold">
+                                          <p:stCondLst>
+                                            <p:cond delay="0"/>
+                                          </p:stCondLst>
+                                        </p:cTn>
+                                        <p:tgtEl>
+                                          <p:spTgt spid="3">
+                                            <p:txEl>
+                                              <p:pRg st="1" end="1"/>
+                                            </p:txEl>
+                                          </p:spTgt>
+                                        </p:tgtEl>
+                                        <p:attrNameLst>
+                                          <p:attrName>style.visibility</p:attrName>
+                                        </p:attrNameLst>
+                                      </p:cBhvr>
+                                      <p:to>
+                                        <p:strVal val="visible"/>
+                                      </p:to>
+                                    </p:set>
+                                    <p:animEffect transition="in" filter="wipe(down)">
+                                      <p:cBhvr>
+                                        <p:cTn id="32" dur="580">
+                                          <p:stCondLst>
+                                            <p:cond delay="0"/>
+                                          </p:stCondLst>
+                                        </p:cTn>
+                                        <p:tgtEl>
+                                          <p:spTgt spid="3">
+                                            <p:txEl>
+                                              <p:pRg st="1" end="1"/>
+                                            </p:txEl>
+                                          </p:spTgt>
+                                        </p:tgtEl>
+                                      </p:cBhvr>
+                                    </p:animEffect>
+                                    <p:anim calcmode="lin" valueType="num">
+                                      <p:cBhvr>
+                                        <p:cTn id="33" dur="1822" tmFilter="0,0; 0.14,0.36; 0.43,0.73; 0.71,0.91; 1.0,1.0">
+                                          <p:stCondLst>
+                                            <p:cond delay="0"/>
+                                          </p:stCondLst>
+                                        </p:cTn>
+                                        <p:tgtEl>
+                                          <p:spTgt spid="3">
+                                            <p:txEl>
+                                              <p:pRg st="1" end="1"/>
+                                            </p:txEl>
+                                          </p:spTgt>
+                                        </p:tgtEl>
+                                        <p:attrNameLst>
+                                          <p:attrName>ppt_x</p:attrName>
+                                        </p:attrNameLst>
+                                      </p:cBhvr>
+                                      <p:tavLst>
+                                        <p:tav tm="0">
+                                          <p:val>
+                                            <p:strVal val="#ppt_x-0.25"/>
+                                          </p:val>
+                                        </p:tav>
+                                        <p:tav tm="100000">
+                                          <p:val>
+                                            <p:strVal val="#ppt_x"/>
+                                          </p:val>
+                                        </p:tav>
+                                      </p:tavLst>
+                                    </p:anim>
+                                    <p:anim calcmode="lin" valueType="num">
+                                      <p:cBhvr>
+                                        <p:cTn id="34" dur="664" tmFilter="0.0,0.0; 0.25,0.07; 0.50,0.2; 0.75,0.467; 1.0,1.0">
+                                          <p:stCondLst>
+                                            <p:cond delay="0"/>
+                                          </p:stCondLst>
+                                        </p:cTn>
+                                        <p:tgtEl>
+                                          <p:spTgt spid="3">
+                                            <p:txEl>
+                                              <p:pRg st="1" end="1"/>
+                                            </p:txEl>
+                                          </p:spTgt>
+                                        </p:tgtEl>
+                                        <p:attrNameLst>
+                                          <p:attrName>ppt_y</p:attrName>
+                                        </p:attrNameLst>
+                                      </p:cBhvr>
+                                      <p:tavLst>
+                                        <p:tav tm="0" fmla="#ppt_y-sin(pi*$)/3">
+                                          <p:val>
+                                            <p:fltVal val="0.5"/>
+                                          </p:val>
+                                        </p:tav>
+                                        <p:tav tm="100000">
+                                          <p:val>
+                                            <p:fltVal val="1"/>
+                                          </p:val>
+                                        </p:tav>
+                                      </p:tavLst>
+                                    </p:anim>
+                                    <p:anim calcmode="lin" valueType="num">
+                                      <p:cBhvr>
+                                        <p:cTn id="35" dur="664" tmFilter="0, 0; 0.125,0.2665; 0.25,0.4; 0.375,0.465; 0.5,0.5;  0.625,0.535; 0.75,0.6; 0.875,0.7335; 1,1">
+                                          <p:stCondLst>
+                                            <p:cond delay="664"/>
+                                          </p:stCondLst>
+                                        </p:cTn>
+                                        <p:tgtEl>
+                                          <p:spTgt spid="3">
+                                            <p:txEl>
+                                              <p:pRg st="1" end="1"/>
+                                            </p:txEl>
+                                          </p:spTgt>
+                                        </p:tgtEl>
+                                        <p:attrNameLst>
+                                          <p:attrName>ppt_y</p:attrName>
+                                        </p:attrNameLst>
+                                      </p:cBhvr>
+                                      <p:tavLst>
+                                        <p:tav tm="0" fmla="#ppt_y-sin(pi*$)/9">
+                                          <p:val>
+                                            <p:fltVal val="0"/>
+                                          </p:val>
+                                        </p:tav>
+                                        <p:tav tm="100000">
+                                          <p:val>
+                                            <p:fltVal val="1"/>
+                                          </p:val>
+                                        </p:tav>
+                                      </p:tavLst>
+                                    </p:anim>
+                                    <p:anim calcmode="lin" valueType="num">
+                                      <p:cBhvr>
+                                        <p:cTn id="36" dur="332" tmFilter="0, 0; 0.125,0.2665; 0.25,0.4; 0.375,0.465; 0.5,0.5;  0.625,0.535; 0.75,0.6; 0.875,0.7335; 1,1">
+                                          <p:stCondLst>
+                                            <p:cond delay="1324"/>
+                                          </p:stCondLst>
+                                        </p:cTn>
+                                        <p:tgtEl>
+                                          <p:spTgt spid="3">
+                                            <p:txEl>
+                                              <p:pRg st="1" end="1"/>
+                                            </p:txEl>
+                                          </p:spTgt>
+                                        </p:tgtEl>
+                                        <p:attrNameLst>
+                                          <p:attrName>ppt_y</p:attrName>
+                                        </p:attrNameLst>
+                                      </p:cBhvr>
+                                      <p:tavLst>
+                                        <p:tav tm="0" fmla="#ppt_y-sin(pi*$)/27">
+                                          <p:val>
+                                            <p:fltVal val="0"/>
+                                          </p:val>
+                                        </p:tav>
+                                        <p:tav tm="100000">
+                                          <p:val>
+                                            <p:fltVal val="1"/>
+                                          </p:val>
+                                        </p:tav>
+                                      </p:tavLst>
+                                    </p:anim>
+                                    <p:anim calcmode="lin" valueType="num">
+                                      <p:cBhvr>
+                                        <p:cTn id="37" dur="164" tmFilter="0, 0; 0.125,0.2665; 0.25,0.4; 0.375,0.465; 0.5,0.5;  0.625,0.535; 0.75,0.6; 0.875,0.7335; 1,1">
+                                          <p:stCondLst>
+                                            <p:cond delay="1656"/>
+                                          </p:stCondLst>
+                                        </p:cTn>
+                                        <p:tgtEl>
+                                          <p:spTgt spid="3">
+                                            <p:txEl>
+                                              <p:pRg st="1" end="1"/>
+                                            </p:txEl>
+                                          </p:spTgt>
+                                        </p:tgtEl>
+                                        <p:attrNameLst>
+                                          <p:attrName>ppt_y</p:attrName>
+                                        </p:attrNameLst>
+                                      </p:cBhvr>
+                                      <p:tavLst>
+                                        <p:tav tm="0" fmla="#ppt_y-sin(pi*$)/81">
+                                          <p:val>
+                                            <p:fltVal val="0"/>
+                                          </p:val>
+                                        </p:tav>
+                                        <p:tav tm="100000">
+                                          <p:val>
+                                            <p:fltVal val="1"/>
+                                          </p:val>
+                                        </p:tav>
+                                      </p:tavLst>
+                                    </p:anim>
+                                    <p:animScale>
+                                      <p:cBhvr>
+                                        <p:cTn id="38" dur="26">
+                                          <p:stCondLst>
+                                            <p:cond delay="650"/>
+                                          </p:stCondLst>
+                                        </p:cTn>
+                                        <p:tgtEl>
+                                          <p:spTgt spid="3">
+                                            <p:txEl>
+                                              <p:pRg st="1" end="1"/>
+                                            </p:txEl>
+                                          </p:spTgt>
+                                        </p:tgtEl>
+                                      </p:cBhvr>
+                                      <p:to x="100000" y="60000"/>
+                                    </p:animScale>
+                                    <p:animScale>
+                                      <p:cBhvr>
+                                        <p:cTn id="39" dur="166" decel="50000">
+                                          <p:stCondLst>
+                                            <p:cond delay="676"/>
+                                          </p:stCondLst>
+                                        </p:cTn>
+                                        <p:tgtEl>
+                                          <p:spTgt spid="3">
+                                            <p:txEl>
+                                              <p:pRg st="1" end="1"/>
+                                            </p:txEl>
+                                          </p:spTgt>
+                                        </p:tgtEl>
+                                      </p:cBhvr>
+                                      <p:to x="100000" y="100000"/>
+                                    </p:animScale>
+                                    <p:animScale>
+                                      <p:cBhvr>
+                                        <p:cTn id="40" dur="26">
+                                          <p:stCondLst>
+                                            <p:cond delay="1312"/>
+                                          </p:stCondLst>
+                                        </p:cTn>
+                                        <p:tgtEl>
+                                          <p:spTgt spid="3">
+                                            <p:txEl>
+                                              <p:pRg st="1" end="1"/>
+                                            </p:txEl>
+                                          </p:spTgt>
+                                        </p:tgtEl>
+                                      </p:cBhvr>
+                                      <p:to x="100000" y="80000"/>
+                                    </p:animScale>
+                                    <p:animScale>
+                                      <p:cBhvr>
+                                        <p:cTn id="41" dur="166" decel="50000">
+                                          <p:stCondLst>
+                                            <p:cond delay="1338"/>
+                                          </p:stCondLst>
+                                        </p:cTn>
+                                        <p:tgtEl>
+                                          <p:spTgt spid="3">
+                                            <p:txEl>
+                                              <p:pRg st="1" end="1"/>
+                                            </p:txEl>
+                                          </p:spTgt>
+                                        </p:tgtEl>
+                                      </p:cBhvr>
+                                      <p:to x="100000" y="100000"/>
+                                    </p:animScale>
+                                    <p:animScale>
+                                      <p:cBhvr>
+                                        <p:cTn id="42" dur="26">
+                                          <p:stCondLst>
+                                            <p:cond delay="1642"/>
+                                          </p:stCondLst>
+                                        </p:cTn>
+                                        <p:tgtEl>
+                                          <p:spTgt spid="3">
+                                            <p:txEl>
+                                              <p:pRg st="1" end="1"/>
+                                            </p:txEl>
+                                          </p:spTgt>
+                                        </p:tgtEl>
+                                      </p:cBhvr>
+                                      <p:to x="100000" y="90000"/>
+                                    </p:animScale>
+                                    <p:animScale>
+                                      <p:cBhvr>
+                                        <p:cTn id="43" dur="166" decel="50000">
+                                          <p:stCondLst>
+                                            <p:cond delay="1668"/>
+                                          </p:stCondLst>
+                                        </p:cTn>
+                                        <p:tgtEl>
+                                          <p:spTgt spid="3">
+                                            <p:txEl>
+                                              <p:pRg st="1" end="1"/>
+                                            </p:txEl>
+                                          </p:spTgt>
+                                        </p:tgtEl>
+                                      </p:cBhvr>
+                                      <p:to x="100000" y="100000"/>
+                                    </p:animScale>
+                                    <p:animScale>
+                                      <p:cBhvr>
+                                        <p:cTn id="44" dur="26">
+                                          <p:stCondLst>
+                                            <p:cond delay="1808"/>
+                                          </p:stCondLst>
+                                        </p:cTn>
+                                        <p:tgtEl>
+                                          <p:spTgt spid="3">
+                                            <p:txEl>
+                                              <p:pRg st="1" end="1"/>
+                                            </p:txEl>
+                                          </p:spTgt>
+                                        </p:tgtEl>
+                                      </p:cBhvr>
+                                      <p:to x="100000" y="95000"/>
+                                    </p:animScale>
+                                    <p:animScale>
+                                      <p:cBhvr>
+                                        <p:cTn id="45" dur="166" decel="50000">
+                                          <p:stCondLst>
+                                            <p:cond delay="1834"/>
+                                          </p:stCondLst>
+                                        </p:cTn>
+                                        <p:tgtEl>
+                                          <p:spTgt spid="3">
+                                            <p:txEl>
+                                              <p:pRg st="1" end="1"/>
+                                            </p:txEl>
+                                          </p:spTgt>
+                                        </p:tgtEl>
+                                      </p:cBhvr>
+                                      <p:to x="100000" y="100000"/>
+                                    </p:animScale>
+                                  </p:childTnLst>
+                                </p:cTn>
+                              </p:par>
+                            </p:childTnLst>
+                          </p:cTn>
+                        </p:par>
+                      </p:childTnLst>
+                    </p:cTn>
+                  </p:par>
+                  <p:par>
+                    <p:cTn id="46" fill="hold">
+                      <p:stCondLst>
+                        <p:cond delay="indefinite"/>
+                      </p:stCondLst>
+                      <p:childTnLst>
+                        <p:par>
+                          <p:cTn id="47" fill="hold">
+                            <p:stCondLst>
+                              <p:cond delay="0"/>
+                            </p:stCondLst>
+                            <p:childTnLst>
+                              <p:par>
+                                <p:cTn id="48" presetID="26" presetClass="entr" presetSubtype="0" fill="hold" grpId="0" nodeType="clickEffect">
+                                  <p:stCondLst>
+                                    <p:cond delay="0"/>
+                                  </p:stCondLst>
+                                  <p:childTnLst>
+                                    <p:set>
+                                      <p:cBhvr>
+                                        <p:cTn id="49" dur="1" fill="hold">
+                                          <p:stCondLst>
+                                            <p:cond delay="0"/>
+                                          </p:stCondLst>
+                                        </p:cTn>
+                                        <p:tgtEl>
+                                          <p:spTgt spid="3">
+                                            <p:txEl>
+                                              <p:pRg st="2" end="2"/>
+                                            </p:txEl>
+                                          </p:spTgt>
+                                        </p:tgtEl>
+                                        <p:attrNameLst>
+                                          <p:attrName>style.visibility</p:attrName>
+                                        </p:attrNameLst>
+                                      </p:cBhvr>
+                                      <p:to>
+                                        <p:strVal val="visible"/>
+                                      </p:to>
+                                    </p:set>
+                                    <p:animEffect transition="in" filter="wipe(down)">
+                                      <p:cBhvr>
+                                        <p:cTn id="50" dur="580">
+                                          <p:stCondLst>
+                                            <p:cond delay="0"/>
+                                          </p:stCondLst>
+                                        </p:cTn>
+                                        <p:tgtEl>
+                                          <p:spTgt spid="3">
+                                            <p:txEl>
+                                              <p:pRg st="2" end="2"/>
+                                            </p:txEl>
+                                          </p:spTgt>
+                                        </p:tgtEl>
+                                      </p:cBhvr>
+                                    </p:animEffect>
+                                    <p:anim calcmode="lin" valueType="num">
+                                      <p:cBhvr>
+                                        <p:cTn id="51" dur="1822" tmFilter="0,0; 0.14,0.36; 0.43,0.73; 0.71,0.91; 1.0,1.0">
+                                          <p:stCondLst>
+                                            <p:cond delay="0"/>
+                                          </p:stCondLst>
+                                        </p:cTn>
+                                        <p:tgtEl>
+                                          <p:spTgt spid="3">
+                                            <p:txEl>
+                                              <p:pRg st="2" end="2"/>
+                                            </p:txEl>
+                                          </p:spTgt>
+                                        </p:tgtEl>
+                                        <p:attrNameLst>
+                                          <p:attrName>ppt_x</p:attrName>
+                                        </p:attrNameLst>
+                                      </p:cBhvr>
+                                      <p:tavLst>
+                                        <p:tav tm="0">
+                                          <p:val>
+                                            <p:strVal val="#ppt_x-0.25"/>
+                                          </p:val>
+                                        </p:tav>
+                                        <p:tav tm="100000">
+                                          <p:val>
+                                            <p:strVal val="#ppt_x"/>
+                                          </p:val>
+                                        </p:tav>
+                                      </p:tavLst>
+                                    </p:anim>
+                                    <p:anim calcmode="lin" valueType="num">
+                                      <p:cBhvr>
+                                        <p:cTn id="52" dur="664" tmFilter="0.0,0.0; 0.25,0.07; 0.50,0.2; 0.75,0.467; 1.0,1.0">
+                                          <p:stCondLst>
+                                            <p:cond delay="0"/>
+                                          </p:stCondLst>
+                                        </p:cTn>
+                                        <p:tgtEl>
+                                          <p:spTgt spid="3">
+                                            <p:txEl>
+                                              <p:pRg st="2" end="2"/>
+                                            </p:txEl>
+                                          </p:spTgt>
+                                        </p:tgtEl>
+                                        <p:attrNameLst>
+                                          <p:attrName>ppt_y</p:attrName>
+                                        </p:attrNameLst>
+                                      </p:cBhvr>
+                                      <p:tavLst>
+                                        <p:tav tm="0" fmla="#ppt_y-sin(pi*$)/3">
+                                          <p:val>
+                                            <p:fltVal val="0.5"/>
+                                          </p:val>
+                                        </p:tav>
+                                        <p:tav tm="100000">
+                                          <p:val>
+                                            <p:fltVal val="1"/>
+                                          </p:val>
+                                        </p:tav>
+                                      </p:tavLst>
+                                    </p:anim>
+                                    <p:anim calcmode="lin" valueType="num">
+                                      <p:cBhvr>
+                                        <p:cTn id="53" dur="664" tmFilter="0, 0; 0.125,0.2665; 0.25,0.4; 0.375,0.465; 0.5,0.5;  0.625,0.535; 0.75,0.6; 0.875,0.7335; 1,1">
+                                          <p:stCondLst>
+                                            <p:cond delay="664"/>
+                                          </p:stCondLst>
+                                        </p:cTn>
+                                        <p:tgtEl>
+                                          <p:spTgt spid="3">
+                                            <p:txEl>
+                                              <p:pRg st="2" end="2"/>
+                                            </p:txEl>
+                                          </p:spTgt>
+                                        </p:tgtEl>
+                                        <p:attrNameLst>
+                                          <p:attrName>ppt_y</p:attrName>
+                                        </p:attrNameLst>
+                                      </p:cBhvr>
+                                      <p:tavLst>
+                                        <p:tav tm="0" fmla="#ppt_y-sin(pi*$)/9">
+                                          <p:val>
+                                            <p:fltVal val="0"/>
+                                          </p:val>
+                                        </p:tav>
+                                        <p:tav tm="100000">
+                                          <p:val>
+                                            <p:fltVal val="1"/>
+                                          </p:val>
+                                        </p:tav>
+                                      </p:tavLst>
+                                    </p:anim>
+                                    <p:anim calcmode="lin" valueType="num">
+                                      <p:cBhvr>
+                                        <p:cTn id="54" dur="332" tmFilter="0, 0; 0.125,0.2665; 0.25,0.4; 0.375,0.465; 0.5,0.5;  0.625,0.535; 0.75,0.6; 0.875,0.7335; 1,1">
+                                          <p:stCondLst>
+                                            <p:cond delay="1324"/>
+                                          </p:stCondLst>
+                                        </p:cTn>
+                                        <p:tgtEl>
+                                          <p:spTgt spid="3">
+                                            <p:txEl>
+                                              <p:pRg st="2" end="2"/>
+                                            </p:txEl>
+                                          </p:spTgt>
+                                        </p:tgtEl>
+                                        <p:attrNameLst>
+                                          <p:attrName>ppt_y</p:attrName>
+                                        </p:attrNameLst>
+                                      </p:cBhvr>
+                                      <p:tavLst>
+                                        <p:tav tm="0" fmla="#ppt_y-sin(pi*$)/27">
+                                          <p:val>
+                                            <p:fltVal val="0"/>
+                                          </p:val>
+                                        </p:tav>
+                                        <p:tav tm="100000">
+                                          <p:val>
+                                            <p:fltVal val="1"/>
+                                          </p:val>
+                                        </p:tav>
+                                      </p:tavLst>
+                                    </p:anim>
+                                    <p:anim calcmode="lin" valueType="num">
+                                      <p:cBhvr>
+                                        <p:cTn id="55" dur="164" tmFilter="0, 0; 0.125,0.2665; 0.25,0.4; 0.375,0.465; 0.5,0.5;  0.625,0.535; 0.75,0.6; 0.875,0.7335; 1,1">
+                                          <p:stCondLst>
+                                            <p:cond delay="1656"/>
+                                          </p:stCondLst>
+                                        </p:cTn>
+                                        <p:tgtEl>
+                                          <p:spTgt spid="3">
+                                            <p:txEl>
+                                              <p:pRg st="2" end="2"/>
+                                            </p:txEl>
+                                          </p:spTgt>
+                                        </p:tgtEl>
+                                        <p:attrNameLst>
+                                          <p:attrName>ppt_y</p:attrName>
+                                        </p:attrNameLst>
+                                      </p:cBhvr>
+                                      <p:tavLst>
+                                        <p:tav tm="0" fmla="#ppt_y-sin(pi*$)/81">
+                                          <p:val>
+                                            <p:fltVal val="0"/>
+                                          </p:val>
+                                        </p:tav>
+                                        <p:tav tm="100000">
+                                          <p:val>
+                                            <p:fltVal val="1"/>
+                                          </p:val>
+                                        </p:tav>
+                                      </p:tavLst>
+                                    </p:anim>
+                                    <p:animScale>
+                                      <p:cBhvr>
+                                        <p:cTn id="56" dur="26">
+                                          <p:stCondLst>
+                                            <p:cond delay="650"/>
+                                          </p:stCondLst>
+                                        </p:cTn>
+                                        <p:tgtEl>
+                                          <p:spTgt spid="3">
+                                            <p:txEl>
+                                              <p:pRg st="2" end="2"/>
+                                            </p:txEl>
+                                          </p:spTgt>
+                                        </p:tgtEl>
+                                      </p:cBhvr>
+                                      <p:to x="100000" y="60000"/>
+                                    </p:animScale>
+                                    <p:animScale>
+                                      <p:cBhvr>
+                                        <p:cTn id="57" dur="166" decel="50000">
+                                          <p:stCondLst>
+                                            <p:cond delay="676"/>
+                                          </p:stCondLst>
+                                        </p:cTn>
+                                        <p:tgtEl>
+                                          <p:spTgt spid="3">
+                                            <p:txEl>
+                                              <p:pRg st="2" end="2"/>
+                                            </p:txEl>
+                                          </p:spTgt>
+                                        </p:tgtEl>
+                                      </p:cBhvr>
+                                      <p:to x="100000" y="100000"/>
+                                    </p:animScale>
+                                    <p:animScale>
+                                      <p:cBhvr>
+                                        <p:cTn id="58" dur="26">
+                                          <p:stCondLst>
+                                            <p:cond delay="1312"/>
+                                          </p:stCondLst>
+                                        </p:cTn>
+                                        <p:tgtEl>
+                                          <p:spTgt spid="3">
+                                            <p:txEl>
+                                              <p:pRg st="2" end="2"/>
+                                            </p:txEl>
+                                          </p:spTgt>
+                                        </p:tgtEl>
+                                      </p:cBhvr>
+                                      <p:to x="100000" y="80000"/>
+                                    </p:animScale>
+                                    <p:animScale>
+                                      <p:cBhvr>
+                                        <p:cTn id="59" dur="166" decel="50000">
+                                          <p:stCondLst>
+                                            <p:cond delay="1338"/>
+                                          </p:stCondLst>
+                                        </p:cTn>
+                                        <p:tgtEl>
+                                          <p:spTgt spid="3">
+                                            <p:txEl>
+                                              <p:pRg st="2" end="2"/>
+                                            </p:txEl>
+                                          </p:spTgt>
+                                        </p:tgtEl>
+                                      </p:cBhvr>
+                                      <p:to x="100000" y="100000"/>
+                                    </p:animScale>
+                                    <p:animScale>
+                                      <p:cBhvr>
+                                        <p:cTn id="60" dur="26">
+                                          <p:stCondLst>
+                                            <p:cond delay="1642"/>
+                                          </p:stCondLst>
+                                        </p:cTn>
+                                        <p:tgtEl>
+                                          <p:spTgt spid="3">
+                                            <p:txEl>
+                                              <p:pRg st="2" end="2"/>
+                                            </p:txEl>
+                                          </p:spTgt>
+                                        </p:tgtEl>
+                                      </p:cBhvr>
+                                      <p:to x="100000" y="90000"/>
+                                    </p:animScale>
+                                    <p:animScale>
+                                      <p:cBhvr>
+                                        <p:cTn id="61" dur="166" decel="50000">
+                                          <p:stCondLst>
+                                            <p:cond delay="1668"/>
+                                          </p:stCondLst>
+                                        </p:cTn>
+                                        <p:tgtEl>
+                                          <p:spTgt spid="3">
+                                            <p:txEl>
+                                              <p:pRg st="2" end="2"/>
+                                            </p:txEl>
+                                          </p:spTgt>
+                                        </p:tgtEl>
+                                      </p:cBhvr>
+                                      <p:to x="100000" y="100000"/>
+                                    </p:animScale>
+                                    <p:animScale>
+                                      <p:cBhvr>
+                                        <p:cTn id="62" dur="26">
+                                          <p:stCondLst>
+                                            <p:cond delay="1808"/>
+                                          </p:stCondLst>
+                                        </p:cTn>
+                                        <p:tgtEl>
+                                          <p:spTgt spid="3">
+                                            <p:txEl>
+                                              <p:pRg st="2" end="2"/>
+                                            </p:txEl>
+                                          </p:spTgt>
+                                        </p:tgtEl>
+                                      </p:cBhvr>
+                                      <p:to x="100000" y="95000"/>
+                                    </p:animScale>
+                                    <p:animScale>
+                                      <p:cBhvr>
+                                        <p:cTn id="63" dur="166" decel="50000">
+                                          <p:stCondLst>
+                                            <p:cond delay="1834"/>
+                                          </p:stCondLst>
+                                        </p:cTn>
+                                        <p:tgtEl>
+                                          <p:spTgt spid="3">
+                                            <p:txEl>
+                                              <p:pRg st="2" end="2"/>
+                                            </p:txEl>
+                                          </p:spTgt>
+                                        </p:tgtEl>
+                                      </p:cBhvr>
+                                      <p:to x="100000" y="100000"/>
+                                    </p:animScale>
+                                  </p:childTnLst>
+                                </p:cTn>
+                              </p:par>
+                            </p:childTnLst>
+                          </p:cTn>
+                        </p:par>
+                      </p:childTnLst>
+                    </p:cTn>
+                  </p:par>
+                  <p:par>
+                    <p:cTn id="64" fill="hold">
+                      <p:stCondLst>
+                        <p:cond delay="indefinite"/>
+                      </p:stCondLst>
+                      <p:childTnLst>
+                        <p:par>
+                          <p:cTn id="65" fill="hold">
+                            <p:stCondLst>
+                              <p:cond delay="0"/>
+                            </p:stCondLst>
+                            <p:childTnLst>
+                              <p:par>
+                                <p:cTn id="66" presetID="26" presetClass="entr" presetSubtype="0" fill="hold" grpId="0" nodeType="clickEffect">
+                                  <p:stCondLst>
+                                    <p:cond delay="0"/>
+                                  </p:stCondLst>
+                                  <p:childTnLst>
+                                    <p:set>
+                                      <p:cBhvr>
+                                        <p:cTn id="67" dur="1" fill="hold">
+                                          <p:stCondLst>
+                                            <p:cond delay="0"/>
+                                          </p:stCondLst>
+                                        </p:cTn>
+                                        <p:tgtEl>
+                                          <p:spTgt spid="3">
+                                            <p:txEl>
+                                              <p:pRg st="3" end="3"/>
+                                            </p:txEl>
+                                          </p:spTgt>
+                                        </p:tgtEl>
+                                        <p:attrNameLst>
+                                          <p:attrName>style.visibility</p:attrName>
+                                        </p:attrNameLst>
+                                      </p:cBhvr>
+                                      <p:to>
+                                        <p:strVal val="visible"/>
+                                      </p:to>
+                                    </p:set>
+                                    <p:animEffect transition="in" filter="wipe(down)">
+                                      <p:cBhvr>
+                                        <p:cTn id="68" dur="580">
+                                          <p:stCondLst>
+                                            <p:cond delay="0"/>
+                                          </p:stCondLst>
+                                        </p:cTn>
+                                        <p:tgtEl>
+                                          <p:spTgt spid="3">
+                                            <p:txEl>
+                                              <p:pRg st="3" end="3"/>
+                                            </p:txEl>
+                                          </p:spTgt>
+                                        </p:tgtEl>
+                                      </p:cBhvr>
+                                    </p:animEffect>
+                                    <p:anim calcmode="lin" valueType="num">
+                                      <p:cBhvr>
+                                        <p:cTn id="69" dur="1822" tmFilter="0,0; 0.14,0.36; 0.43,0.73; 0.71,0.91; 1.0,1.0">
+                                          <p:stCondLst>
+                                            <p:cond delay="0"/>
+                                          </p:stCondLst>
+                                        </p:cTn>
+                                        <p:tgtEl>
+                                          <p:spTgt spid="3">
+                                            <p:txEl>
+                                              <p:pRg st="3" end="3"/>
+                                            </p:txEl>
+                                          </p:spTgt>
+                                        </p:tgtEl>
+                                        <p:attrNameLst>
+                                          <p:attrName>ppt_x</p:attrName>
+                                        </p:attrNameLst>
+                                      </p:cBhvr>
+                                      <p:tavLst>
+                                        <p:tav tm="0">
+                                          <p:val>
+                                            <p:strVal val="#ppt_x-0.25"/>
+                                          </p:val>
+                                        </p:tav>
+                                        <p:tav tm="100000">
+                                          <p:val>
+                                            <p:strVal val="#ppt_x"/>
+                                          </p:val>
+                                        </p:tav>
+                                      </p:tavLst>
+                                    </p:anim>
+                                    <p:anim calcmode="lin" valueType="num">
+                                      <p:cBhvr>
+                                        <p:cTn id="70" dur="664" tmFilter="0.0,0.0; 0.25,0.07; 0.50,0.2; 0.75,0.467; 1.0,1.0">
+                                          <p:stCondLst>
+                                            <p:cond delay="0"/>
+                                          </p:stCondLst>
+                                        </p:cTn>
+                                        <p:tgtEl>
+                                          <p:spTgt spid="3">
+                                            <p:txEl>
+                                              <p:pRg st="3" end="3"/>
+                                            </p:txEl>
+                                          </p:spTgt>
+                                        </p:tgtEl>
+                                        <p:attrNameLst>
+                                          <p:attrName>ppt_y</p:attrName>
+                                        </p:attrNameLst>
+                                      </p:cBhvr>
+                                      <p:tavLst>
+                                        <p:tav tm="0" fmla="#ppt_y-sin(pi*$)/3">
+                                          <p:val>
+                                            <p:fltVal val="0.5"/>
+                                          </p:val>
+                                        </p:tav>
+                                        <p:tav tm="100000">
+                                          <p:val>
+                                            <p:fltVal val="1"/>
+                                          </p:val>
+                                        </p:tav>
+                                      </p:tavLst>
+                                    </p:anim>
+                                    <p:anim calcmode="lin" valueType="num">
+                                      <p:cBhvr>
+                                        <p:cTn id="71" dur="664" tmFilter="0, 0; 0.125,0.2665; 0.25,0.4; 0.375,0.465; 0.5,0.5;  0.625,0.535; 0.75,0.6; 0.875,0.7335; 1,1">
+                                          <p:stCondLst>
+                                            <p:cond delay="664"/>
+                                          </p:stCondLst>
+                                        </p:cTn>
+                                        <p:tgtEl>
+                                          <p:spTgt spid="3">
+                                            <p:txEl>
+                                              <p:pRg st="3" end="3"/>
+                                            </p:txEl>
+                                          </p:spTgt>
+                                        </p:tgtEl>
+                                        <p:attrNameLst>
+                                          <p:attrName>ppt_y</p:attrName>
+                                        </p:attrNameLst>
+                                      </p:cBhvr>
+                                      <p:tavLst>
+                                        <p:tav tm="0" fmla="#ppt_y-sin(pi*$)/9">
+                                          <p:val>
+                                            <p:fltVal val="0"/>
+                                          </p:val>
+                                        </p:tav>
+                                        <p:tav tm="100000">
+                                          <p:val>
+                                            <p:fltVal val="1"/>
+                                          </p:val>
+                                        </p:tav>
+                                      </p:tavLst>
+                                    </p:anim>
+                                    <p:anim calcmode="lin" valueType="num">
+                                      <p:cBhvr>
+                                        <p:cTn id="72" dur="332" tmFilter="0, 0; 0.125,0.2665; 0.25,0.4; 0.375,0.465; 0.5,0.5;  0.625,0.535; 0.75,0.6; 0.875,0.7335; 1,1">
+                                          <p:stCondLst>
+                                            <p:cond delay="1324"/>
+                                          </p:stCondLst>
+                                        </p:cTn>
+                                        <p:tgtEl>
+                                          <p:spTgt spid="3">
+                                            <p:txEl>
+                                              <p:pRg st="3" end="3"/>
+                                            </p:txEl>
+                                          </p:spTgt>
+                                        </p:tgtEl>
+                                        <p:attrNameLst>
+                                          <p:attrName>ppt_y</p:attrName>
+                                        </p:attrNameLst>
+                                      </p:cBhvr>
+                                      <p:tavLst>
+                                        <p:tav tm="0" fmla="#ppt_y-sin(pi*$)/27">
+                                          <p:val>
+                                            <p:fltVal val="0"/>
+                                          </p:val>
+                                        </p:tav>
+                                        <p:tav tm="100000">
+                                          <p:val>
+                                            <p:fltVal val="1"/>
+                                          </p:val>
+                                        </p:tav>
+                                      </p:tavLst>
+                                    </p:anim>
+                                    <p:anim calcmode="lin" valueType="num">
+                                      <p:cBhvr>
+                                        <p:cTn id="73" dur="164" tmFilter="0, 0; 0.125,0.2665; 0.25,0.4; 0.375,0.465; 0.5,0.5;  0.625,0.535; 0.75,0.6; 0.875,0.7335; 1,1">
+                                          <p:stCondLst>
+                                            <p:cond delay="1656"/>
+                                          </p:stCondLst>
+                                        </p:cTn>
+                                        <p:tgtEl>
+                                          <p:spTgt spid="3">
+                                            <p:txEl>
+                                              <p:pRg st="3" end="3"/>
+                                            </p:txEl>
+                                          </p:spTgt>
+                                        </p:tgtEl>
+                                        <p:attrNameLst>
+                                          <p:attrName>ppt_y</p:attrName>
+                                        </p:attrNameLst>
+                                      </p:cBhvr>
+                                      <p:tavLst>
+                                        <p:tav tm="0" fmla="#ppt_y-sin(pi*$)/81">
+                                          <p:val>
+                                            <p:fltVal val="0"/>
+                                          </p:val>
+                                        </p:tav>
+                                        <p:tav tm="100000">
+                                          <p:val>
+                                            <p:fltVal val="1"/>
+                                          </p:val>
+                                        </p:tav>
+                                      </p:tavLst>
+                                    </p:anim>
+                                    <p:animScale>
+                                      <p:cBhvr>
+                                        <p:cTn id="74" dur="26">
+                                          <p:stCondLst>
+                                            <p:cond delay="650"/>
+                                          </p:stCondLst>
+                                        </p:cTn>
+                                        <p:tgtEl>
+                                          <p:spTgt spid="3">
+                                            <p:txEl>
+                                              <p:pRg st="3" end="3"/>
+                                            </p:txEl>
+                                          </p:spTgt>
+                                        </p:tgtEl>
+                                      </p:cBhvr>
+                                      <p:to x="100000" y="60000"/>
+                                    </p:animScale>
+                                    <p:animScale>
+                                      <p:cBhvr>
+                                        <p:cTn id="75" dur="166" decel="50000">
+                                          <p:stCondLst>
+                                            <p:cond delay="676"/>
+                                          </p:stCondLst>
+                                        </p:cTn>
+                                        <p:tgtEl>
+                                          <p:spTgt spid="3">
+                                            <p:txEl>
+                                              <p:pRg st="3" end="3"/>
+                                            </p:txEl>
+                                          </p:spTgt>
+                                        </p:tgtEl>
+                                      </p:cBhvr>
+                                      <p:to x="100000" y="100000"/>
+                                    </p:animScale>
+                                    <p:animScale>
+                                      <p:cBhvr>
+                                        <p:cTn id="76" dur="26">
+                                          <p:stCondLst>
+                                            <p:cond delay="1312"/>
+                                          </p:stCondLst>
+                                        </p:cTn>
+                                        <p:tgtEl>
+                                          <p:spTgt spid="3">
+                                            <p:txEl>
+                                              <p:pRg st="3" end="3"/>
+                                            </p:txEl>
+                                          </p:spTgt>
+                                        </p:tgtEl>
+                                      </p:cBhvr>
+                                      <p:to x="100000" y="80000"/>
+                                    </p:animScale>
+                                    <p:animScale>
+                                      <p:cBhvr>
+                                        <p:cTn id="77" dur="166" decel="50000">
+                                          <p:stCondLst>
+                                            <p:cond delay="1338"/>
+                                          </p:stCondLst>
+                                        </p:cTn>
+                                        <p:tgtEl>
+                                          <p:spTgt spid="3">
+                                            <p:txEl>
+                                              <p:pRg st="3" end="3"/>
+                                            </p:txEl>
+                                          </p:spTgt>
+                                        </p:tgtEl>
+                                      </p:cBhvr>
+                                      <p:to x="100000" y="100000"/>
+                                    </p:animScale>
+                                    <p:animScale>
+                                      <p:cBhvr>
+                                        <p:cTn id="78" dur="26">
+                                          <p:stCondLst>
+                                            <p:cond delay="1642"/>
+                                          </p:stCondLst>
+                                        </p:cTn>
+                                        <p:tgtEl>
+                                          <p:spTgt spid="3">
+                                            <p:txEl>
+                                              <p:pRg st="3" end="3"/>
+                                            </p:txEl>
+                                          </p:spTgt>
+                                        </p:tgtEl>
+                                      </p:cBhvr>
+                                      <p:to x="100000" y="90000"/>
+                                    </p:animScale>
+                                    <p:animScale>
+                                      <p:cBhvr>
+                                        <p:cTn id="79" dur="166" decel="50000">
+                                          <p:stCondLst>
+                                            <p:cond delay="1668"/>
+                                          </p:stCondLst>
+                                        </p:cTn>
+                                        <p:tgtEl>
+                                          <p:spTgt spid="3">
+                                            <p:txEl>
+                                              <p:pRg st="3" end="3"/>
+                                            </p:txEl>
+                                          </p:spTgt>
+                                        </p:tgtEl>
+                                      </p:cBhvr>
+                                      <p:to x="100000" y="100000"/>
+                                    </p:animScale>
+                                    <p:animScale>
+                                      <p:cBhvr>
+                                        <p:cTn id="80" dur="26">
+                                          <p:stCondLst>
+                                            <p:cond delay="1808"/>
+                                          </p:stCondLst>
+                                        </p:cTn>
+                                        <p:tgtEl>
+                                          <p:spTgt spid="3">
+                                            <p:txEl>
+                                              <p:pRg st="3" end="3"/>
+                                            </p:txEl>
+                                          </p:spTgt>
+                                        </p:tgtEl>
+                                      </p:cBhvr>
+                                      <p:to x="100000" y="95000"/>
+                                    </p:animScale>
+                                    <p:animScale>
+                                      <p:cBhvr>
+                                        <p:cTn id="81" dur="166" decel="50000">
+                                          <p:stCondLst>
+                                            <p:cond delay="1834"/>
+                                          </p:stCondLst>
+                                        </p:cTn>
+                                        <p:tgtEl>
+                                          <p:spTgt spid="3">
+                                            <p:txEl>
+                                              <p:pRg st="3" end="3"/>
+                                            </p:txEl>
+                                          </p:spTgt>
+                                        </p:tgtEl>
+                                      </p:cBhvr>
+                                      <p:to x="100000" y="100000"/>
+                                    </p:animScale>
+                                  </p:childTnLst>
+                                </p:cTn>
+                              </p:par>
+                            </p:childTnLst>
+                          </p:cTn>
+                        </p:par>
+                      </p:childTnLst>
+                    </p:cTn>
+                  </p:par>
+                  <p:par>
+                    <p:cTn id="82" fill="hold">
+                      <p:stCondLst>
+                        <p:cond delay="indefinite"/>
+                      </p:stCondLst>
+                      <p:childTnLst>
+                        <p:par>
+                          <p:cTn id="83" fill="hold">
+                            <p:stCondLst>
+                              <p:cond delay="0"/>
+                            </p:stCondLst>
+                            <p:childTnLst>
+                              <p:par>
+                                <p:cTn id="84" presetID="26" presetClass="entr" presetSubtype="0" fill="hold" grpId="0" nodeType="clickEffect">
+                                  <p:stCondLst>
+                                    <p:cond delay="0"/>
+                                  </p:stCondLst>
+                                  <p:childTnLst>
+                                    <p:set>
+                                      <p:cBhvr>
+                                        <p:cTn id="85" dur="1" fill="hold">
+                                          <p:stCondLst>
+                                            <p:cond delay="0"/>
+                                          </p:stCondLst>
+                                        </p:cTn>
+                                        <p:tgtEl>
+                                          <p:spTgt spid="3">
+                                            <p:txEl>
+                                              <p:pRg st="4" end="4"/>
+                                            </p:txEl>
+                                          </p:spTgt>
+                                        </p:tgtEl>
+                                        <p:attrNameLst>
+                                          <p:attrName>style.visibility</p:attrName>
+                                        </p:attrNameLst>
+                                      </p:cBhvr>
+                                      <p:to>
+                                        <p:strVal val="visible"/>
+                                      </p:to>
+                                    </p:set>
+                                    <p:animEffect transition="in" filter="wipe(down)">
+                                      <p:cBhvr>
+                                        <p:cTn id="86" dur="580">
+                                          <p:stCondLst>
+                                            <p:cond delay="0"/>
+                                          </p:stCondLst>
+                                        </p:cTn>
+                                        <p:tgtEl>
+                                          <p:spTgt spid="3">
+                                            <p:txEl>
+                                              <p:pRg st="4" end="4"/>
+                                            </p:txEl>
+                                          </p:spTgt>
+                                        </p:tgtEl>
+                                      </p:cBhvr>
+                                    </p:animEffect>
+                                    <p:anim calcmode="lin" valueType="num">
+                                      <p:cBhvr>
+                                        <p:cTn id="87" dur="1822" tmFilter="0,0; 0.14,0.36; 0.43,0.73; 0.71,0.91; 1.0,1.0">
+                                          <p:stCondLst>
+                                            <p:cond delay="0"/>
+                                          </p:stCondLst>
+                                        </p:cTn>
+                                        <p:tgtEl>
+                                          <p:spTgt spid="3">
+                                            <p:txEl>
+                                              <p:pRg st="4" end="4"/>
+                                            </p:txEl>
+                                          </p:spTgt>
+                                        </p:tgtEl>
+                                        <p:attrNameLst>
+                                          <p:attrName>ppt_x</p:attrName>
+                                        </p:attrNameLst>
+                                      </p:cBhvr>
+                                      <p:tavLst>
+                                        <p:tav tm="0">
+                                          <p:val>
+                                            <p:strVal val="#ppt_x-0.25"/>
+                                          </p:val>
+                                        </p:tav>
+                                        <p:tav tm="100000">
+                                          <p:val>
+                                            <p:strVal val="#ppt_x"/>
+                                          </p:val>
+                                        </p:tav>
+                                      </p:tavLst>
+                                    </p:anim>
+                                    <p:anim calcmode="lin" valueType="num">
+                                      <p:cBhvr>
+                                        <p:cTn id="88" dur="664" tmFilter="0.0,0.0; 0.25,0.07; 0.50,0.2; 0.75,0.467; 1.0,1.0">
+                                          <p:stCondLst>
+                                            <p:cond delay="0"/>
+                                          </p:stCondLst>
+                                        </p:cTn>
+                                        <p:tgtEl>
+                                          <p:spTgt spid="3">
+                                            <p:txEl>
+                                              <p:pRg st="4" end="4"/>
+                                            </p:txEl>
+                                          </p:spTgt>
+                                        </p:tgtEl>
+                                        <p:attrNameLst>
+                                          <p:attrName>ppt_y</p:attrName>
+                                        </p:attrNameLst>
+                                      </p:cBhvr>
+                                      <p:tavLst>
+                                        <p:tav tm="0" fmla="#ppt_y-sin(pi*$)/3">
+                                          <p:val>
+                                            <p:fltVal val="0.5"/>
+                                          </p:val>
+                                        </p:tav>
+                                        <p:tav tm="100000">
+                                          <p:val>
+                                            <p:fltVal val="1"/>
+                                          </p:val>
+                                        </p:tav>
+                                      </p:tavLst>
+                                    </p:anim>
+                                    <p:anim calcmode="lin" valueType="num">
+                                      <p:cBhvr>
+                                        <p:cTn id="89" dur="664" tmFilter="0, 0; 0.125,0.2665; 0.25,0.4; 0.375,0.465; 0.5,0.5;  0.625,0.535; 0.75,0.6; 0.875,0.7335; 1,1">
+                                          <p:stCondLst>
+                                            <p:cond delay="664"/>
+                                          </p:stCondLst>
+                                        </p:cTn>
+                                        <p:tgtEl>
+                                          <p:spTgt spid="3">
+                                            <p:txEl>
+                                              <p:pRg st="4" end="4"/>
+                                            </p:txEl>
+                                          </p:spTgt>
+                                        </p:tgtEl>
+                                        <p:attrNameLst>
+                                          <p:attrName>ppt_y</p:attrName>
+                                        </p:attrNameLst>
+                                      </p:cBhvr>
+                                      <p:tavLst>
+                                        <p:tav tm="0" fmla="#ppt_y-sin(pi*$)/9">
+                                          <p:val>
+                                            <p:fltVal val="0"/>
+                                          </p:val>
+                                        </p:tav>
+                                        <p:tav tm="100000">
+                                          <p:val>
+                                            <p:fltVal val="1"/>
+                                          </p:val>
+                                        </p:tav>
+                                      </p:tavLst>
+                                    </p:anim>
+                                    <p:anim calcmode="lin" valueType="num">
+                                      <p:cBhvr>
+                                        <p:cTn id="90" dur="332" tmFilter="0, 0; 0.125,0.2665; 0.25,0.4; 0.375,0.465; 0.5,0.5;  0.625,0.535; 0.75,0.6; 0.875,0.7335; 1,1">
+                                          <p:stCondLst>
+                                            <p:cond delay="1324"/>
+                                          </p:stCondLst>
+                                        </p:cTn>
+                                        <p:tgtEl>
+                                          <p:spTgt spid="3">
+                                            <p:txEl>
+                                              <p:pRg st="4" end="4"/>
+                                            </p:txEl>
+                                          </p:spTgt>
+                                        </p:tgtEl>
+                                        <p:attrNameLst>
+                                          <p:attrName>ppt_y</p:attrName>
+                                        </p:attrNameLst>
+                                      </p:cBhvr>
+                                      <p:tavLst>
+                                        <p:tav tm="0" fmla="#ppt_y-sin(pi*$)/27">
+                                          <p:val>
+                                            <p:fltVal val="0"/>
+                                          </p:val>
+                                        </p:tav>
+                                        <p:tav tm="100000">
+                                          <p:val>
+                                            <p:fltVal val="1"/>
+                                          </p:val>
+                                        </p:tav>
+                                      </p:tavLst>
+                                    </p:anim>
+                                    <p:anim calcmode="lin" valueType="num">
+                                      <p:cBhvr>
+                                        <p:cTn id="91" dur="164" tmFilter="0, 0; 0.125,0.2665; 0.25,0.4; 0.375,0.465; 0.5,0.5;  0.625,0.535; 0.75,0.6; 0.875,0.7335; 1,1">
+                                          <p:stCondLst>
+                                            <p:cond delay="1656"/>
+                                          </p:stCondLst>
+                                        </p:cTn>
+                                        <p:tgtEl>
+                                          <p:spTgt spid="3">
+                                            <p:txEl>
+                                              <p:pRg st="4" end="4"/>
+                                            </p:txEl>
+                                          </p:spTgt>
+                                        </p:tgtEl>
+                                        <p:attrNameLst>
+                                          <p:attrName>ppt_y</p:attrName>
+                                        </p:attrNameLst>
+                                      </p:cBhvr>
+                                      <p:tavLst>
+                                        <p:tav tm="0" fmla="#ppt_y-sin(pi*$)/81">
+                                          <p:val>
+                                            <p:fltVal val="0"/>
+                                          </p:val>
+                                        </p:tav>
+                                        <p:tav tm="100000">
+                                          <p:val>
+                                            <p:fltVal val="1"/>
+                                          </p:val>
+                                        </p:tav>
+                                      </p:tavLst>
+                                    </p:anim>
+                                    <p:animScale>
+                                      <p:cBhvr>
+                                        <p:cTn id="92" dur="26">
+                                          <p:stCondLst>
+                                            <p:cond delay="650"/>
+                                          </p:stCondLst>
+                                        </p:cTn>
+                                        <p:tgtEl>
+                                          <p:spTgt spid="3">
+                                            <p:txEl>
+                                              <p:pRg st="4" end="4"/>
+                                            </p:txEl>
+                                          </p:spTgt>
+                                        </p:tgtEl>
+                                      </p:cBhvr>
+                                      <p:to x="100000" y="60000"/>
+                                    </p:animScale>
+                                    <p:animScale>
+                                      <p:cBhvr>
+                                        <p:cTn id="93" dur="166" decel="50000">
+                                          <p:stCondLst>
+                                            <p:cond delay="676"/>
+                                          </p:stCondLst>
+                                        </p:cTn>
+                                        <p:tgtEl>
+                                          <p:spTgt spid="3">
+                                            <p:txEl>
+                                              <p:pRg st="4" end="4"/>
+                                            </p:txEl>
+                                          </p:spTgt>
+                                        </p:tgtEl>
+                                      </p:cBhvr>
+                                      <p:to x="100000" y="100000"/>
+                                    </p:animScale>
+                                    <p:animScale>
+                                      <p:cBhvr>
+                                        <p:cTn id="94" dur="26">
+                                          <p:stCondLst>
+                                            <p:cond delay="1312"/>
+                                          </p:stCondLst>
+                                        </p:cTn>
+                                        <p:tgtEl>
+                                          <p:spTgt spid="3">
+                                            <p:txEl>
+                                              <p:pRg st="4" end="4"/>
+                                            </p:txEl>
+                                          </p:spTgt>
+                                        </p:tgtEl>
+                                      </p:cBhvr>
+                                      <p:to x="100000" y="80000"/>
+                                    </p:animScale>
+                                    <p:animScale>
+                                      <p:cBhvr>
+                                        <p:cTn id="95" dur="166" decel="50000">
+                                          <p:stCondLst>
+                                            <p:cond delay="1338"/>
+                                          </p:stCondLst>
+                                        </p:cTn>
+                                        <p:tgtEl>
+                                          <p:spTgt spid="3">
+                                            <p:txEl>
+                                              <p:pRg st="4" end="4"/>
+                                            </p:txEl>
+                                          </p:spTgt>
+                                        </p:tgtEl>
+                                      </p:cBhvr>
+                                      <p:to x="100000" y="100000"/>
+                                    </p:animScale>
+                                    <p:animScale>
+                                      <p:cBhvr>
+                                        <p:cTn id="96" dur="26">
+                                          <p:stCondLst>
+                                            <p:cond delay="1642"/>
+                                          </p:stCondLst>
+                                        </p:cTn>
+                                        <p:tgtEl>
+                                          <p:spTgt spid="3">
+                                            <p:txEl>
+                                              <p:pRg st="4" end="4"/>
+                                            </p:txEl>
+                                          </p:spTgt>
+                                        </p:tgtEl>
+                                      </p:cBhvr>
+                                      <p:to x="100000" y="90000"/>
+                                    </p:animScale>
+                                    <p:animScale>
+                                      <p:cBhvr>
+                                        <p:cTn id="97" dur="166" decel="50000">
+                                          <p:stCondLst>
+                                            <p:cond delay="1668"/>
+                                          </p:stCondLst>
+                                        </p:cTn>
+                                        <p:tgtEl>
+                                          <p:spTgt spid="3">
+                                            <p:txEl>
+                                              <p:pRg st="4" end="4"/>
+                                            </p:txEl>
+                                          </p:spTgt>
+                                        </p:tgtEl>
+                                      </p:cBhvr>
+                                      <p:to x="100000" y="100000"/>
+                                    </p:animScale>
+                                    <p:animScale>
+                                      <p:cBhvr>
+                                        <p:cTn id="98" dur="26">
+                                          <p:stCondLst>
+                                            <p:cond delay="1808"/>
+                                          </p:stCondLst>
+                                        </p:cTn>
+                                        <p:tgtEl>
+                                          <p:spTgt spid="3">
+                                            <p:txEl>
+                                              <p:pRg st="4" end="4"/>
+                                            </p:txEl>
+                                          </p:spTgt>
+                                        </p:tgtEl>
+                                      </p:cBhvr>
+                                      <p:to x="100000" y="95000"/>
+                                    </p:animScale>
+                                    <p:animScale>
+                                      <p:cBhvr>
+                                        <p:cTn id="99" dur="166" decel="50000">
+                                          <p:stCondLst>
+                                            <p:cond delay="1834"/>
+                                          </p:stCondLst>
+                                        </p:cTn>
+                                        <p:tgtEl>
+                                          <p:spTgt spid="3">
+                                            <p:txEl>
+                                              <p:pRg st="4" end="4"/>
+                                            </p:txEl>
+                                          </p:spTgt>
+                                        </p:tgtEl>
+                                      </p:cBhvr>
+                                      <p:to x="100000" y="100000"/>
+                                    </p:animScale>
+                                  </p:childTnLst>
+                                </p:cTn>
+                              </p:par>
+                            </p:childTnLst>
+                          </p:cTn>
+                        </p:par>
+                      </p:childTnLst>
+                    </p:cTn>
+                  </p:par>
+                </p:childTnLst>
+              </p:cTn>
+              <p:prevCondLst>
+                <p:cond evt="onPrev" delay="0">
+                  <p:tgtEl>
+                    <p:sldTgt/>
+                  </p:tgtEl>
+                </p:cond>
+              </p:prevCondLst>
+              <p:nextCondLst>
+                <p:cond evt="onNext" delay="0">
+                  <p:tgtEl>
+                    <p:sldTgt/>
+                  </p:tgtEl>
+                </p:cond>
+              </p:nextCondLst>
+            </p:seq>
+          </p:childTnLst>
+        </p:cTn>
+      </p:par>
+    </p:tnLst>
+    <p:bldLst>
+      <p:bldP spid="3" grpId="0" build="p"/>
+    </p:bldLst>
+  </p:timing>
 </p:sld>
 </file>
 

</xml_diff>